<commit_message>
Update before laptop dies.
</commit_message>
<xml_diff>
--- a/Presentations/Class 04 – Sept 25.pptx
+++ b/Presentations/Class 04 – Sept 25.pptx
@@ -5,7 +5,7 @@
     <p:sldMasterId id="2147483660" r:id="rId1"/>
   </p:sldMasterIdLst>
   <p:notesMasterIdLst>
-    <p:notesMasterId r:id="rId52"/>
+    <p:notesMasterId r:id="rId54"/>
   </p:notesMasterIdLst>
   <p:sldIdLst>
     <p:sldId id="256" r:id="rId2"/>
@@ -26,38 +26,40 @@
     <p:sldId id="293" r:id="rId17"/>
     <p:sldId id="294" r:id="rId18"/>
     <p:sldId id="305" r:id="rId19"/>
-    <p:sldId id="306" r:id="rId20"/>
-    <p:sldId id="269" r:id="rId21"/>
-    <p:sldId id="271" r:id="rId22"/>
-    <p:sldId id="274" r:id="rId23"/>
-    <p:sldId id="275" r:id="rId24"/>
-    <p:sldId id="276" r:id="rId25"/>
-    <p:sldId id="273" r:id="rId26"/>
-    <p:sldId id="279" r:id="rId27"/>
-    <p:sldId id="272" r:id="rId28"/>
-    <p:sldId id="277" r:id="rId29"/>
-    <p:sldId id="283" r:id="rId30"/>
-    <p:sldId id="295" r:id="rId31"/>
-    <p:sldId id="296" r:id="rId32"/>
-    <p:sldId id="298" r:id="rId33"/>
-    <p:sldId id="297" r:id="rId34"/>
-    <p:sldId id="281" r:id="rId35"/>
-    <p:sldId id="286" r:id="rId36"/>
-    <p:sldId id="287" r:id="rId37"/>
-    <p:sldId id="288" r:id="rId38"/>
-    <p:sldId id="289" r:id="rId39"/>
-    <p:sldId id="270" r:id="rId40"/>
-    <p:sldId id="290" r:id="rId41"/>
-    <p:sldId id="301" r:id="rId42"/>
-    <p:sldId id="304" r:id="rId43"/>
-    <p:sldId id="299" r:id="rId44"/>
-    <p:sldId id="300" r:id="rId45"/>
-    <p:sldId id="310" r:id="rId46"/>
-    <p:sldId id="308" r:id="rId47"/>
-    <p:sldId id="302" r:id="rId48"/>
-    <p:sldId id="303" r:id="rId49"/>
-    <p:sldId id="307" r:id="rId50"/>
-    <p:sldId id="309" r:id="rId51"/>
+    <p:sldId id="311" r:id="rId20"/>
+    <p:sldId id="306" r:id="rId21"/>
+    <p:sldId id="269" r:id="rId22"/>
+    <p:sldId id="271" r:id="rId23"/>
+    <p:sldId id="274" r:id="rId24"/>
+    <p:sldId id="275" r:id="rId25"/>
+    <p:sldId id="276" r:id="rId26"/>
+    <p:sldId id="273" r:id="rId27"/>
+    <p:sldId id="279" r:id="rId28"/>
+    <p:sldId id="272" r:id="rId29"/>
+    <p:sldId id="277" r:id="rId30"/>
+    <p:sldId id="283" r:id="rId31"/>
+    <p:sldId id="295" r:id="rId32"/>
+    <p:sldId id="296" r:id="rId33"/>
+    <p:sldId id="298" r:id="rId34"/>
+    <p:sldId id="297" r:id="rId35"/>
+    <p:sldId id="281" r:id="rId36"/>
+    <p:sldId id="286" r:id="rId37"/>
+    <p:sldId id="287" r:id="rId38"/>
+    <p:sldId id="288" r:id="rId39"/>
+    <p:sldId id="289" r:id="rId40"/>
+    <p:sldId id="270" r:id="rId41"/>
+    <p:sldId id="290" r:id="rId42"/>
+    <p:sldId id="301" r:id="rId43"/>
+    <p:sldId id="304" r:id="rId44"/>
+    <p:sldId id="299" r:id="rId45"/>
+    <p:sldId id="312" r:id="rId46"/>
+    <p:sldId id="300" r:id="rId47"/>
+    <p:sldId id="310" r:id="rId48"/>
+    <p:sldId id="308" r:id="rId49"/>
+    <p:sldId id="302" r:id="rId50"/>
+    <p:sldId id="303" r:id="rId51"/>
+    <p:sldId id="307" r:id="rId52"/>
+    <p:sldId id="309" r:id="rId53"/>
   </p:sldIdLst>
   <p:sldSz cx="12192000" cy="6858000"/>
   <p:notesSz cx="6858000" cy="9144000"/>
@@ -561,10 +563,7 @@
           <a:bodyPr/>
           <a:lstStyle/>
           <a:p>
-            <a:r>
-              <a:rPr lang="en-US" dirty="0"/>
-              <a:t>Answer: https://codepen.io/crhallberg/full/gGLvqW</a:t>
-            </a:r>
+            <a:endParaRPr lang="en-US" dirty="0"/>
           </a:p>
         </p:txBody>
       </p:sp>
@@ -585,7 +584,7 @@
           <a:p>
             <a:fld id="{4363A5FA-A976-4620-BFE3-90A3FAF2E4A6}" type="slidenum">
               <a:rPr lang="en-US" smtClean="0"/>
-              <a:t>39</a:t>
+              <a:t>18</a:t>
             </a:fld>
             <a:endParaRPr lang="en-US"/>
           </a:p>
@@ -594,7 +593,7 @@
     </p:spTree>
     <p:extLst>
       <p:ext uri="{BB962C8B-B14F-4D97-AF65-F5344CB8AC3E}">
-        <p14:creationId xmlns:p14="http://schemas.microsoft.com/office/powerpoint/2010/main" val="1340618133"/>
+        <p14:creationId xmlns:p14="http://schemas.microsoft.com/office/powerpoint/2010/main" val="1669295435"/>
       </p:ext>
     </p:extLst>
   </p:cSld>
@@ -650,6 +649,93 @@
           <a:p>
             <a:r>
               <a:rPr lang="en-US" dirty="0"/>
+              <a:t>Answer: https://codepen.io/crhallberg/full/gGLvqW</a:t>
+            </a:r>
+          </a:p>
+        </p:txBody>
+      </p:sp>
+      <p:sp>
+        <p:nvSpPr>
+          <p:cNvPr id="4" name="Slide Number Placeholder 3"/>
+          <p:cNvSpPr>
+            <a:spLocks noGrp="1"/>
+          </p:cNvSpPr>
+          <p:nvPr>
+            <p:ph type="sldNum" sz="quarter" idx="10"/>
+          </p:nvPr>
+        </p:nvSpPr>
+        <p:spPr/>
+        <p:txBody>
+          <a:bodyPr/>
+          <a:lstStyle/>
+          <a:p>
+            <a:fld id="{4363A5FA-A976-4620-BFE3-90A3FAF2E4A6}" type="slidenum">
+              <a:rPr lang="en-US" smtClean="0"/>
+              <a:t>40</a:t>
+            </a:fld>
+            <a:endParaRPr lang="en-US"/>
+          </a:p>
+        </p:txBody>
+      </p:sp>
+    </p:spTree>
+    <p:extLst>
+      <p:ext uri="{BB962C8B-B14F-4D97-AF65-F5344CB8AC3E}">
+        <p14:creationId xmlns:p14="http://schemas.microsoft.com/office/powerpoint/2010/main" val="1340618133"/>
+      </p:ext>
+    </p:extLst>
+  </p:cSld>
+  <p:clrMapOvr>
+    <a:masterClrMapping/>
+  </p:clrMapOvr>
+</p:notes>
+</file>
+
+<file path=ppt/notesSlides/notesSlide3.xml><?xml version="1.0" encoding="utf-8"?>
+<p:notes xmlns:a="http://schemas.openxmlformats.org/drawingml/2006/main" xmlns:r="http://schemas.openxmlformats.org/officeDocument/2006/relationships" xmlns:p="http://schemas.openxmlformats.org/presentationml/2006/main">
+  <p:cSld>
+    <p:spTree>
+      <p:nvGrpSpPr>
+        <p:cNvPr id="1" name=""/>
+        <p:cNvGrpSpPr/>
+        <p:nvPr/>
+      </p:nvGrpSpPr>
+      <p:grpSpPr>
+        <a:xfrm>
+          <a:off x="0" y="0"/>
+          <a:ext cx="0" cy="0"/>
+          <a:chOff x="0" y="0"/>
+          <a:chExt cx="0" cy="0"/>
+        </a:xfrm>
+      </p:grpSpPr>
+      <p:sp>
+        <p:nvSpPr>
+          <p:cNvPr id="2" name="Slide Image Placeholder 1"/>
+          <p:cNvSpPr>
+            <a:spLocks noGrp="1" noRot="1" noChangeAspect="1"/>
+          </p:cNvSpPr>
+          <p:nvPr>
+            <p:ph type="sldImg"/>
+          </p:nvPr>
+        </p:nvSpPr>
+        <p:spPr/>
+      </p:sp>
+      <p:sp>
+        <p:nvSpPr>
+          <p:cNvPr id="3" name="Notes Placeholder 2"/>
+          <p:cNvSpPr>
+            <a:spLocks noGrp="1"/>
+          </p:cNvSpPr>
+          <p:nvPr>
+            <p:ph type="body" idx="1"/>
+          </p:nvPr>
+        </p:nvSpPr>
+        <p:spPr/>
+        <p:txBody>
+          <a:bodyPr/>
+          <a:lstStyle/>
+          <a:p>
+            <a:r>
+              <a:rPr lang="en-US" dirty="0"/>
               <a:t>Use map. Refer </a:t>
             </a:r>
             <a:r>
@@ -680,7 +766,7 @@
           <a:p>
             <a:fld id="{4363A5FA-A976-4620-BFE3-90A3FAF2E4A6}" type="slidenum">
               <a:rPr lang="en-US" smtClean="0"/>
-              <a:t>46</a:t>
+              <a:t>48</a:t>
             </a:fld>
             <a:endParaRPr lang="en-US"/>
           </a:p>
@@ -690,6 +776,102 @@
     <p:extLst>
       <p:ext uri="{BB962C8B-B14F-4D97-AF65-F5344CB8AC3E}">
         <p14:creationId xmlns:p14="http://schemas.microsoft.com/office/powerpoint/2010/main" val="346543626"/>
+      </p:ext>
+    </p:extLst>
+  </p:cSld>
+  <p:clrMapOvr>
+    <a:masterClrMapping/>
+  </p:clrMapOvr>
+</p:notes>
+</file>
+
+<file path=ppt/notesSlides/notesSlide4.xml><?xml version="1.0" encoding="utf-8"?>
+<p:notes xmlns:a="http://schemas.openxmlformats.org/drawingml/2006/main" xmlns:r="http://schemas.openxmlformats.org/officeDocument/2006/relationships" xmlns:p="http://schemas.openxmlformats.org/presentationml/2006/main">
+  <p:cSld>
+    <p:spTree>
+      <p:nvGrpSpPr>
+        <p:cNvPr id="1" name=""/>
+        <p:cNvGrpSpPr/>
+        <p:nvPr/>
+      </p:nvGrpSpPr>
+      <p:grpSpPr>
+        <a:xfrm>
+          <a:off x="0" y="0"/>
+          <a:ext cx="0" cy="0"/>
+          <a:chOff x="0" y="0"/>
+          <a:chExt cx="0" cy="0"/>
+        </a:xfrm>
+      </p:grpSpPr>
+      <p:sp>
+        <p:nvSpPr>
+          <p:cNvPr id="2" name="Slide Image Placeholder 1"/>
+          <p:cNvSpPr>
+            <a:spLocks noGrp="1" noRot="1" noChangeAspect="1"/>
+          </p:cNvSpPr>
+          <p:nvPr>
+            <p:ph type="sldImg"/>
+          </p:nvPr>
+        </p:nvSpPr>
+        <p:spPr/>
+      </p:sp>
+      <p:sp>
+        <p:nvSpPr>
+          <p:cNvPr id="3" name="Notes Placeholder 2"/>
+          <p:cNvSpPr>
+            <a:spLocks noGrp="1"/>
+          </p:cNvSpPr>
+          <p:nvPr>
+            <p:ph type="body" idx="1"/>
+          </p:nvPr>
+        </p:nvSpPr>
+        <p:spPr/>
+        <p:txBody>
+          <a:bodyPr/>
+          <a:lstStyle/>
+          <a:p>
+            <a:r>
+              <a:rPr lang="en-US" dirty="0"/>
+              <a:t>FLAPPY BIRD ON WEDNESDAY</a:t>
+            </a:r>
+          </a:p>
+          <a:p>
+            <a:endParaRPr lang="en-US" dirty="0"/>
+          </a:p>
+          <a:p>
+            <a:r>
+              <a:rPr lang="en-US" dirty="0"/>
+              <a:t>Thank you, Lillian, for the music suggestions. Add yours on the Canvas discussion!</a:t>
+            </a:r>
+          </a:p>
+        </p:txBody>
+      </p:sp>
+      <p:sp>
+        <p:nvSpPr>
+          <p:cNvPr id="4" name="Slide Number Placeholder 3"/>
+          <p:cNvSpPr>
+            <a:spLocks noGrp="1"/>
+          </p:cNvSpPr>
+          <p:nvPr>
+            <p:ph type="sldNum" sz="quarter" idx="10"/>
+          </p:nvPr>
+        </p:nvSpPr>
+        <p:spPr/>
+        <p:txBody>
+          <a:bodyPr/>
+          <a:lstStyle/>
+          <a:p>
+            <a:fld id="{4363A5FA-A976-4620-BFE3-90A3FAF2E4A6}" type="slidenum">
+              <a:rPr lang="en-US" smtClean="0"/>
+              <a:t>50</a:t>
+            </a:fld>
+            <a:endParaRPr lang="en-US"/>
+          </a:p>
+        </p:txBody>
+      </p:sp>
+    </p:spTree>
+    <p:extLst>
+      <p:ext uri="{BB962C8B-B14F-4D97-AF65-F5344CB8AC3E}">
+        <p14:creationId xmlns:p14="http://schemas.microsoft.com/office/powerpoint/2010/main" val="995976040"/>
       </p:ext>
     </p:extLst>
   </p:cSld>
@@ -3622,10 +3804,9 @@
           </a:p>
           <a:p>
             <a:r>
-              <a:rPr lang="en-US"/>
+              <a:rPr lang="en-US" dirty="0"/>
               <a:t>Rotation</a:t>
             </a:r>
-            <a:endParaRPr lang="en-US" dirty="0"/>
           </a:p>
         </p:txBody>
       </p:sp>
@@ -3687,31 +3868,6 @@
           </a:p>
         </p:txBody>
       </p:sp>
-      <p:sp>
-        <p:nvSpPr>
-          <p:cNvPr id="3" name="Text Placeholder 2">
-            <a:extLst>
-              <a:ext uri="{FF2B5EF4-FFF2-40B4-BE49-F238E27FC236}">
-                <a16:creationId xmlns:a16="http://schemas.microsoft.com/office/drawing/2014/main" id="{22A2DC72-3B5D-4953-8C32-C8EF16E4D56A}"/>
-              </a:ext>
-            </a:extLst>
-          </p:cNvPr>
-          <p:cNvSpPr>
-            <a:spLocks noGrp="1"/>
-          </p:cNvSpPr>
-          <p:nvPr>
-            <p:ph type="body" idx="1"/>
-          </p:nvPr>
-        </p:nvSpPr>
-        <p:spPr/>
-        <p:txBody>
-          <a:bodyPr/>
-          <a:lstStyle/>
-          <a:p>
-            <a:endParaRPr lang="en-US"/>
-          </a:p>
-        </p:txBody>
-      </p:sp>
     </p:spTree>
     <p:extLst>
       <p:ext uri="{BB962C8B-B14F-4D97-AF65-F5344CB8AC3E}">
@@ -3765,7 +3921,7 @@
           <a:p>
             <a:r>
               <a:rPr lang="en-US" dirty="0"/>
-              <a:t>Semantics vs. Syntax</a:t>
+              <a:t>Syntax vs. Semantics</a:t>
             </a:r>
           </a:p>
         </p:txBody>
@@ -4947,10 +5103,10 @@
       </p:grpSpPr>
       <p:sp>
         <p:nvSpPr>
-          <p:cNvPr id="2" name="Title 1">
-            <a:extLst>
-              <a:ext uri="{FF2B5EF4-FFF2-40B4-BE49-F238E27FC236}">
-                <a16:creationId xmlns:a16="http://schemas.microsoft.com/office/drawing/2014/main" id="{6DCD8F7C-A7B1-4B28-B9BA-D3105DD40833}"/>
+          <p:cNvPr id="4" name="Title 3">
+            <a:extLst>
+              <a:ext uri="{FF2B5EF4-FFF2-40B4-BE49-F238E27FC236}">
+                <a16:creationId xmlns:a16="http://schemas.microsoft.com/office/drawing/2014/main" id="{FA0AAC76-6BD1-46CB-B94A-7ED6A192D10A}"/>
               </a:ext>
             </a:extLst>
           </p:cNvPr>
@@ -4967,161 +5123,47 @@
           <a:lstStyle/>
           <a:p>
             <a:r>
-              <a:rPr lang="en-US" dirty="0"/>
-              <a:t>% (modulo)</a:t>
-            </a:r>
-          </a:p>
-        </p:txBody>
-      </p:sp>
-      <p:sp>
-        <p:nvSpPr>
-          <p:cNvPr id="3" name="Content Placeholder 2">
-            <a:extLst>
-              <a:ext uri="{FF2B5EF4-FFF2-40B4-BE49-F238E27FC236}">
-                <a16:creationId xmlns:a16="http://schemas.microsoft.com/office/drawing/2014/main" id="{1172DA17-FF34-4D62-A9AF-7C41C0B7E38A}"/>
-              </a:ext>
-            </a:extLst>
-          </p:cNvPr>
-          <p:cNvSpPr>
-            <a:spLocks noGrp="1"/>
-          </p:cNvSpPr>
-          <p:nvPr>
-            <p:ph idx="1"/>
-          </p:nvPr>
-        </p:nvSpPr>
-        <p:spPr/>
-        <p:txBody>
-          <a:bodyPr/>
-          <a:lstStyle/>
-          <a:p>
-            <a:r>
-              <a:rPr lang="en-US" dirty="0"/>
-              <a:t>Returns the remainder of division</a:t>
-            </a:r>
-          </a:p>
-          <a:p>
-            <a:endParaRPr lang="en-US" dirty="0"/>
-          </a:p>
-          <a:p>
+              <a:rPr lang="en-US" dirty="0">
+                <a:hlinkClick r:id="rId2"/>
+              </a:rPr>
+              <a:t>https://cdpn.io/e/KXavez</a:t>
+            </a:r>
             <a:r>
               <a:rPr lang="en-US" dirty="0"/>
               <a:t> </a:t>
             </a:r>
-            <a:r>
-              <a:rPr lang="en-US" dirty="0">
-                <a:latin typeface="Consolas" panose="020B0609020204030204" pitchFamily="49" charset="0"/>
-                <a:cs typeface="Consolas" panose="020B0609020204030204" pitchFamily="49" charset="0"/>
-              </a:rPr>
-              <a:t>6 / 4 == 1.5 </a:t>
-            </a:r>
-            <a:r>
-              <a:rPr lang="en-US" sz="2400" i="1" dirty="0">
-                <a:latin typeface="Consolas" panose="020B0609020204030204" pitchFamily="49" charset="0"/>
-                <a:cs typeface="Consolas" panose="020B0609020204030204" pitchFamily="49" charset="0"/>
-              </a:rPr>
-              <a:t>vs.</a:t>
-            </a:r>
-            <a:r>
-              <a:rPr lang="en-US" dirty="0">
-                <a:latin typeface="Consolas" panose="020B0609020204030204" pitchFamily="49" charset="0"/>
-                <a:cs typeface="Consolas" panose="020B0609020204030204" pitchFamily="49" charset="0"/>
-              </a:rPr>
-              <a:t> 6 % 4 == 2</a:t>
-            </a:r>
-          </a:p>
-          <a:p>
-            <a:endParaRPr lang="en-US" dirty="0">
-              <a:latin typeface="Consolas" panose="020B0609020204030204" pitchFamily="49" charset="0"/>
-              <a:cs typeface="Consolas" panose="020B0609020204030204" pitchFamily="49" charset="0"/>
-            </a:endParaRPr>
-          </a:p>
-          <a:p>
-            <a:r>
-              <a:rPr lang="en-US" b="1" i="1" dirty="0">
-                <a:latin typeface="Consolas" panose="020B0609020204030204" pitchFamily="49" charset="0"/>
-                <a:cs typeface="Consolas" panose="020B0609020204030204" pitchFamily="49" charset="0"/>
-              </a:rPr>
-              <a:t>SUPER USEFUL</a:t>
-            </a:r>
-          </a:p>
-          <a:p>
-            <a:pPr lvl="1"/>
-            <a:r>
-              <a:rPr lang="en-US" dirty="0" err="1">
-                <a:latin typeface="Consolas" panose="020B0609020204030204" pitchFamily="49" charset="0"/>
-                <a:cs typeface="Consolas" panose="020B0609020204030204" pitchFamily="49" charset="0"/>
-              </a:rPr>
-              <a:t>num</a:t>
-            </a:r>
-            <a:r>
-              <a:rPr lang="en-US" dirty="0">
-                <a:latin typeface="Consolas" panose="020B0609020204030204" pitchFamily="49" charset="0"/>
-                <a:cs typeface="Consolas" panose="020B0609020204030204" pitchFamily="49" charset="0"/>
-              </a:rPr>
-              <a:t> % 2 == 0; // </a:t>
-            </a:r>
-            <a:r>
-              <a:rPr lang="en-US" dirty="0" err="1">
-                <a:latin typeface="Consolas" panose="020B0609020204030204" pitchFamily="49" charset="0"/>
-                <a:cs typeface="Consolas" panose="020B0609020204030204" pitchFamily="49" charset="0"/>
-              </a:rPr>
-              <a:t>num</a:t>
-            </a:r>
-            <a:r>
-              <a:rPr lang="en-US" dirty="0">
-                <a:latin typeface="Consolas" panose="020B0609020204030204" pitchFamily="49" charset="0"/>
-                <a:cs typeface="Consolas" panose="020B0609020204030204" pitchFamily="49" charset="0"/>
-              </a:rPr>
-              <a:t> is even</a:t>
-            </a:r>
-          </a:p>
-          <a:p>
-            <a:pPr lvl="1"/>
-            <a:r>
-              <a:rPr lang="en-US" dirty="0" err="1">
-                <a:latin typeface="Consolas" panose="020B0609020204030204" pitchFamily="49" charset="0"/>
-                <a:cs typeface="Consolas" panose="020B0609020204030204" pitchFamily="49" charset="0"/>
-              </a:rPr>
-              <a:t>num</a:t>
-            </a:r>
-            <a:r>
-              <a:rPr lang="en-US" dirty="0">
-                <a:latin typeface="Consolas" panose="020B0609020204030204" pitchFamily="49" charset="0"/>
-                <a:cs typeface="Consolas" panose="020B0609020204030204" pitchFamily="49" charset="0"/>
-              </a:rPr>
-              <a:t> % 7 == 0; // </a:t>
-            </a:r>
-            <a:r>
-              <a:rPr lang="en-US" dirty="0" err="1">
-                <a:latin typeface="Consolas" panose="020B0609020204030204" pitchFamily="49" charset="0"/>
-                <a:cs typeface="Consolas" panose="020B0609020204030204" pitchFamily="49" charset="0"/>
-              </a:rPr>
-              <a:t>num</a:t>
-            </a:r>
-            <a:r>
-              <a:rPr lang="en-US" dirty="0">
-                <a:latin typeface="Consolas" panose="020B0609020204030204" pitchFamily="49" charset="0"/>
-                <a:cs typeface="Consolas" panose="020B0609020204030204" pitchFamily="49" charset="0"/>
-              </a:rPr>
-              <a:t> is divisible by 7</a:t>
-            </a:r>
-          </a:p>
-          <a:p>
-            <a:pPr lvl="1"/>
-            <a:r>
-              <a:rPr lang="en-US" dirty="0">
-                <a:latin typeface="Consolas" panose="020B0609020204030204" pitchFamily="49" charset="0"/>
-                <a:cs typeface="Consolas" panose="020B0609020204030204" pitchFamily="49" charset="0"/>
-              </a:rPr>
-              <a:t>count = count % 10; // number will loop 0-9</a:t>
-            </a:r>
+          </a:p>
+        </p:txBody>
+      </p:sp>
+      <p:sp>
+        <p:nvSpPr>
+          <p:cNvPr id="5" name="Text Placeholder 4">
+            <a:extLst>
+              <a:ext uri="{FF2B5EF4-FFF2-40B4-BE49-F238E27FC236}">
+                <a16:creationId xmlns:a16="http://schemas.microsoft.com/office/drawing/2014/main" id="{DC56D2A5-A96F-4396-94BF-1B16A95E5F19}"/>
+              </a:ext>
+            </a:extLst>
+          </p:cNvPr>
+          <p:cNvSpPr>
+            <a:spLocks noGrp="1"/>
+          </p:cNvSpPr>
+          <p:nvPr>
+            <p:ph type="body" idx="1"/>
+          </p:nvPr>
+        </p:nvSpPr>
+        <p:spPr/>
+        <p:txBody>
+          <a:bodyPr/>
+          <a:lstStyle/>
+          <a:p>
+            <a:endParaRPr lang="en-US"/>
           </a:p>
         </p:txBody>
       </p:sp>
     </p:spTree>
     <p:extLst>
       <p:ext uri="{BB962C8B-B14F-4D97-AF65-F5344CB8AC3E}">
-        <p14:creationId xmlns:p14="http://schemas.microsoft.com/office/powerpoint/2010/main" val="2376279819"/>
+        <p14:creationId xmlns:p14="http://schemas.microsoft.com/office/powerpoint/2010/main" val="3226258583"/>
       </p:ext>
     </p:extLst>
   </p:cSld>
@@ -5171,7 +5213,7 @@
           <a:p>
             <a:r>
               <a:rPr lang="en-US" dirty="0"/>
-              <a:t>Previous, in IMM120</a:t>
+              <a:t>Previously, in IMM120</a:t>
             </a:r>
           </a:p>
         </p:txBody>
@@ -5275,6 +5317,209 @@
           <p:cNvPr id="2" name="Title 1">
             <a:extLst>
               <a:ext uri="{FF2B5EF4-FFF2-40B4-BE49-F238E27FC236}">
+                <a16:creationId xmlns:a16="http://schemas.microsoft.com/office/drawing/2014/main" id="{6DCD8F7C-A7B1-4B28-B9BA-D3105DD40833}"/>
+              </a:ext>
+            </a:extLst>
+          </p:cNvPr>
+          <p:cNvSpPr>
+            <a:spLocks noGrp="1"/>
+          </p:cNvSpPr>
+          <p:nvPr>
+            <p:ph type="title"/>
+          </p:nvPr>
+        </p:nvSpPr>
+        <p:spPr/>
+        <p:txBody>
+          <a:bodyPr/>
+          <a:lstStyle/>
+          <a:p>
+            <a:r>
+              <a:rPr lang="en-US" dirty="0"/>
+              <a:t>% (modulo)</a:t>
+            </a:r>
+          </a:p>
+        </p:txBody>
+      </p:sp>
+      <p:sp>
+        <p:nvSpPr>
+          <p:cNvPr id="3" name="Content Placeholder 2">
+            <a:extLst>
+              <a:ext uri="{FF2B5EF4-FFF2-40B4-BE49-F238E27FC236}">
+                <a16:creationId xmlns:a16="http://schemas.microsoft.com/office/drawing/2014/main" id="{1172DA17-FF34-4D62-A9AF-7C41C0B7E38A}"/>
+              </a:ext>
+            </a:extLst>
+          </p:cNvPr>
+          <p:cNvSpPr>
+            <a:spLocks noGrp="1"/>
+          </p:cNvSpPr>
+          <p:nvPr>
+            <p:ph idx="1"/>
+          </p:nvPr>
+        </p:nvSpPr>
+        <p:spPr/>
+        <p:txBody>
+          <a:bodyPr/>
+          <a:lstStyle/>
+          <a:p>
+            <a:r>
+              <a:rPr lang="en-US" dirty="0"/>
+              <a:t>Returns the remainder of division</a:t>
+            </a:r>
+          </a:p>
+          <a:p>
+            <a:endParaRPr lang="en-US" dirty="0"/>
+          </a:p>
+          <a:p>
+            <a:r>
+              <a:rPr lang="en-US" dirty="0"/>
+              <a:t> </a:t>
+            </a:r>
+            <a:r>
+              <a:rPr lang="en-US" dirty="0">
+                <a:latin typeface="Consolas" panose="020B0609020204030204" pitchFamily="49" charset="0"/>
+                <a:cs typeface="Consolas" panose="020B0609020204030204" pitchFamily="49" charset="0"/>
+              </a:rPr>
+              <a:t>6 / 4 == 1.5 </a:t>
+            </a:r>
+            <a:r>
+              <a:rPr lang="en-US" sz="2400" i="1" dirty="0">
+                <a:latin typeface="Consolas" panose="020B0609020204030204" pitchFamily="49" charset="0"/>
+                <a:cs typeface="Consolas" panose="020B0609020204030204" pitchFamily="49" charset="0"/>
+              </a:rPr>
+              <a:t>vs.</a:t>
+            </a:r>
+            <a:r>
+              <a:rPr lang="en-US" dirty="0">
+                <a:latin typeface="Consolas" panose="020B0609020204030204" pitchFamily="49" charset="0"/>
+                <a:cs typeface="Consolas" panose="020B0609020204030204" pitchFamily="49" charset="0"/>
+              </a:rPr>
+              <a:t> 6 % 4 == 2</a:t>
+            </a:r>
+          </a:p>
+          <a:p>
+            <a:endParaRPr lang="en-US" dirty="0">
+              <a:latin typeface="Consolas" panose="020B0609020204030204" pitchFamily="49" charset="0"/>
+              <a:cs typeface="Consolas" panose="020B0609020204030204" pitchFamily="49" charset="0"/>
+            </a:endParaRPr>
+          </a:p>
+          <a:p>
+            <a:r>
+              <a:rPr lang="en-US" b="1" i="1" dirty="0">
+                <a:latin typeface="Consolas" panose="020B0609020204030204" pitchFamily="49" charset="0"/>
+                <a:cs typeface="Consolas" panose="020B0609020204030204" pitchFamily="49" charset="0"/>
+              </a:rPr>
+              <a:t>SUPER USEFUL</a:t>
+            </a:r>
+          </a:p>
+          <a:p>
+            <a:pPr lvl="1"/>
+            <a:r>
+              <a:rPr lang="en-US" dirty="0" err="1">
+                <a:latin typeface="Consolas" panose="020B0609020204030204" pitchFamily="49" charset="0"/>
+                <a:cs typeface="Consolas" panose="020B0609020204030204" pitchFamily="49" charset="0"/>
+              </a:rPr>
+              <a:t>num</a:t>
+            </a:r>
+            <a:r>
+              <a:rPr lang="en-US" dirty="0">
+                <a:latin typeface="Consolas" panose="020B0609020204030204" pitchFamily="49" charset="0"/>
+                <a:cs typeface="Consolas" panose="020B0609020204030204" pitchFamily="49" charset="0"/>
+              </a:rPr>
+              <a:t> % 2 == 0; // </a:t>
+            </a:r>
+            <a:r>
+              <a:rPr lang="en-US" dirty="0" err="1">
+                <a:latin typeface="Consolas" panose="020B0609020204030204" pitchFamily="49" charset="0"/>
+                <a:cs typeface="Consolas" panose="020B0609020204030204" pitchFamily="49" charset="0"/>
+              </a:rPr>
+              <a:t>num</a:t>
+            </a:r>
+            <a:r>
+              <a:rPr lang="en-US" dirty="0">
+                <a:latin typeface="Consolas" panose="020B0609020204030204" pitchFamily="49" charset="0"/>
+                <a:cs typeface="Consolas" panose="020B0609020204030204" pitchFamily="49" charset="0"/>
+              </a:rPr>
+              <a:t> is even</a:t>
+            </a:r>
+          </a:p>
+          <a:p>
+            <a:pPr lvl="1"/>
+            <a:r>
+              <a:rPr lang="en-US" dirty="0" err="1">
+                <a:latin typeface="Consolas" panose="020B0609020204030204" pitchFamily="49" charset="0"/>
+                <a:cs typeface="Consolas" panose="020B0609020204030204" pitchFamily="49" charset="0"/>
+              </a:rPr>
+              <a:t>num</a:t>
+            </a:r>
+            <a:r>
+              <a:rPr lang="en-US" dirty="0">
+                <a:latin typeface="Consolas" panose="020B0609020204030204" pitchFamily="49" charset="0"/>
+                <a:cs typeface="Consolas" panose="020B0609020204030204" pitchFamily="49" charset="0"/>
+              </a:rPr>
+              <a:t> % 7 == 0; // </a:t>
+            </a:r>
+            <a:r>
+              <a:rPr lang="en-US" dirty="0" err="1">
+                <a:latin typeface="Consolas" panose="020B0609020204030204" pitchFamily="49" charset="0"/>
+                <a:cs typeface="Consolas" panose="020B0609020204030204" pitchFamily="49" charset="0"/>
+              </a:rPr>
+              <a:t>num</a:t>
+            </a:r>
+            <a:r>
+              <a:rPr lang="en-US" dirty="0">
+                <a:latin typeface="Consolas" panose="020B0609020204030204" pitchFamily="49" charset="0"/>
+                <a:cs typeface="Consolas" panose="020B0609020204030204" pitchFamily="49" charset="0"/>
+              </a:rPr>
+              <a:t> is divisible by 7</a:t>
+            </a:r>
+          </a:p>
+          <a:p>
+            <a:pPr lvl="1"/>
+            <a:r>
+              <a:rPr lang="en-US" dirty="0">
+                <a:latin typeface="Consolas" panose="020B0609020204030204" pitchFamily="49" charset="0"/>
+                <a:cs typeface="Consolas" panose="020B0609020204030204" pitchFamily="49" charset="0"/>
+              </a:rPr>
+              <a:t>count = count % 10; // number will loop 0-9</a:t>
+            </a:r>
+          </a:p>
+        </p:txBody>
+      </p:sp>
+    </p:spTree>
+    <p:extLst>
+      <p:ext uri="{BB962C8B-B14F-4D97-AF65-F5344CB8AC3E}">
+        <p14:creationId xmlns:p14="http://schemas.microsoft.com/office/powerpoint/2010/main" val="2376279819"/>
+      </p:ext>
+    </p:extLst>
+  </p:cSld>
+  <p:clrMapOvr>
+    <a:masterClrMapping/>
+  </p:clrMapOvr>
+</p:sld>
+</file>
+
+<file path=ppt/slides/slide21.xml><?xml version="1.0" encoding="utf-8"?>
+<p:sld xmlns:a="http://schemas.openxmlformats.org/drawingml/2006/main" xmlns:r="http://schemas.openxmlformats.org/officeDocument/2006/relationships" xmlns:p="http://schemas.openxmlformats.org/presentationml/2006/main">
+  <p:cSld>
+    <p:spTree>
+      <p:nvGrpSpPr>
+        <p:cNvPr id="1" name=""/>
+        <p:cNvGrpSpPr/>
+        <p:nvPr/>
+      </p:nvGrpSpPr>
+      <p:grpSpPr>
+        <a:xfrm>
+          <a:off x="0" y="0"/>
+          <a:ext cx="0" cy="0"/>
+          <a:chOff x="0" y="0"/>
+          <a:chExt cx="0" cy="0"/>
+        </a:xfrm>
+      </p:grpSpPr>
+      <p:sp>
+        <p:nvSpPr>
+          <p:cNvPr id="2" name="Title 1">
+            <a:extLst>
+              <a:ext uri="{FF2B5EF4-FFF2-40B4-BE49-F238E27FC236}">
                 <a16:creationId xmlns:a16="http://schemas.microsoft.com/office/drawing/2014/main" id="{E2CDEC9D-C74F-4016-A981-26B0E41EEF5B}"/>
               </a:ext>
             </a:extLst>
@@ -5295,31 +5540,6 @@
               <a:rPr lang="en-US" dirty="0"/>
               <a:t>Organizing Code</a:t>
             </a:r>
-          </a:p>
-        </p:txBody>
-      </p:sp>
-      <p:sp>
-        <p:nvSpPr>
-          <p:cNvPr id="3" name="Text Placeholder 2">
-            <a:extLst>
-              <a:ext uri="{FF2B5EF4-FFF2-40B4-BE49-F238E27FC236}">
-                <a16:creationId xmlns:a16="http://schemas.microsoft.com/office/drawing/2014/main" id="{0D0482DB-4793-438C-8565-B65213F9384A}"/>
-              </a:ext>
-            </a:extLst>
-          </p:cNvPr>
-          <p:cNvSpPr>
-            <a:spLocks noGrp="1"/>
-          </p:cNvSpPr>
-          <p:nvPr>
-            <p:ph type="body" idx="1"/>
-          </p:nvPr>
-        </p:nvSpPr>
-        <p:spPr/>
-        <p:txBody>
-          <a:bodyPr/>
-          <a:lstStyle/>
-          <a:p>
-            <a:endParaRPr lang="en-US" dirty="0"/>
           </a:p>
         </p:txBody>
       </p:sp>
@@ -5336,7 +5556,7 @@
 </p:sld>
 </file>
 
-<file path=ppt/slides/slide21.xml><?xml version="1.0" encoding="utf-8"?>
+<file path=ppt/slides/slide22.xml><?xml version="1.0" encoding="utf-8"?>
 <p:sld xmlns:a="http://schemas.openxmlformats.org/drawingml/2006/main" xmlns:r="http://schemas.openxmlformats.org/officeDocument/2006/relationships" xmlns:p="http://schemas.openxmlformats.org/presentationml/2006/main">
   <p:cSld>
     <p:spTree>
@@ -5452,7 +5672,7 @@
 </p:sld>
 </file>
 
-<file path=ppt/slides/slide22.xml><?xml version="1.0" encoding="utf-8"?>
+<file path=ppt/slides/slide23.xml><?xml version="1.0" encoding="utf-8"?>
 <p:sld xmlns:a="http://schemas.openxmlformats.org/drawingml/2006/main" xmlns:r="http://schemas.openxmlformats.org/officeDocument/2006/relationships" xmlns:p="http://schemas.openxmlformats.org/presentationml/2006/main">
   <p:cSld>
     <p:spTree>
@@ -5584,7 +5804,7 @@
 </p:sld>
 </file>
 
-<file path=ppt/slides/slide23.xml><?xml version="1.0" encoding="utf-8"?>
+<file path=ppt/slides/slide24.xml><?xml version="1.0" encoding="utf-8"?>
 <p:sld xmlns:a="http://schemas.openxmlformats.org/drawingml/2006/main" xmlns:r="http://schemas.openxmlformats.org/officeDocument/2006/relationships" xmlns:p="http://schemas.openxmlformats.org/presentationml/2006/main">
   <p:cSld>
     <p:spTree>
@@ -5672,7 +5892,7 @@
 </p:sld>
 </file>
 
-<file path=ppt/slides/slide24.xml><?xml version="1.0" encoding="utf-8"?>
+<file path=ppt/slides/slide25.xml><?xml version="1.0" encoding="utf-8"?>
 <p:sld xmlns:a="http://schemas.openxmlformats.org/drawingml/2006/main" xmlns:r="http://schemas.openxmlformats.org/officeDocument/2006/relationships" xmlns:p="http://schemas.openxmlformats.org/presentationml/2006/main">
   <p:cSld>
     <p:spTree>
@@ -5812,7 +6032,7 @@
 </p:sld>
 </file>
 
-<file path=ppt/slides/slide25.xml><?xml version="1.0" encoding="utf-8"?>
+<file path=ppt/slides/slide26.xml><?xml version="1.0" encoding="utf-8"?>
 <p:sld xmlns:a="http://schemas.openxmlformats.org/drawingml/2006/main" xmlns:r="http://schemas.openxmlformats.org/officeDocument/2006/relationships" xmlns:p="http://schemas.openxmlformats.org/presentationml/2006/main">
   <p:cSld>
     <p:spTree>
@@ -5991,243 +6211,6 @@
     <p:extLst>
       <p:ext uri="{BB962C8B-B14F-4D97-AF65-F5344CB8AC3E}">
         <p14:creationId xmlns:p14="http://schemas.microsoft.com/office/powerpoint/2010/main" val="691527676"/>
-      </p:ext>
-    </p:extLst>
-  </p:cSld>
-  <p:clrMapOvr>
-    <a:masterClrMapping/>
-  </p:clrMapOvr>
-</p:sld>
-</file>
-
-<file path=ppt/slides/slide26.xml><?xml version="1.0" encoding="utf-8"?>
-<p:sld xmlns:a="http://schemas.openxmlformats.org/drawingml/2006/main" xmlns:r="http://schemas.openxmlformats.org/officeDocument/2006/relationships" xmlns:p="http://schemas.openxmlformats.org/presentationml/2006/main">
-  <p:cSld>
-    <p:spTree>
-      <p:nvGrpSpPr>
-        <p:cNvPr id="1" name=""/>
-        <p:cNvGrpSpPr/>
-        <p:nvPr/>
-      </p:nvGrpSpPr>
-      <p:grpSpPr>
-        <a:xfrm>
-          <a:off x="0" y="0"/>
-          <a:ext cx="0" cy="0"/>
-          <a:chOff x="0" y="0"/>
-          <a:chExt cx="0" cy="0"/>
-        </a:xfrm>
-      </p:grpSpPr>
-      <p:sp>
-        <p:nvSpPr>
-          <p:cNvPr id="2" name="Title 1">
-            <a:extLst>
-              <a:ext uri="{FF2B5EF4-FFF2-40B4-BE49-F238E27FC236}">
-                <a16:creationId xmlns:a16="http://schemas.microsoft.com/office/drawing/2014/main" id="{8D77FCEC-2587-4B48-892B-3D902F737714}"/>
-              </a:ext>
-            </a:extLst>
-          </p:cNvPr>
-          <p:cNvSpPr>
-            <a:spLocks noGrp="1"/>
-          </p:cNvSpPr>
-          <p:nvPr>
-            <p:ph type="title"/>
-          </p:nvPr>
-        </p:nvSpPr>
-        <p:spPr/>
-        <p:txBody>
-          <a:bodyPr/>
-          <a:lstStyle/>
-          <a:p>
-            <a:r>
-              <a:rPr lang="en-US" dirty="0"/>
-              <a:t>if-else statements</a:t>
-            </a:r>
-          </a:p>
-        </p:txBody>
-      </p:sp>
-      <p:pic>
-        <p:nvPicPr>
-          <p:cNvPr id="4" name="Content Placeholder 3">
-            <a:extLst>
-              <a:ext uri="{FF2B5EF4-FFF2-40B4-BE49-F238E27FC236}">
-                <a16:creationId xmlns:a16="http://schemas.microsoft.com/office/drawing/2014/main" id="{9191AD96-AB6D-4D9C-9915-D83550876DAE}"/>
-              </a:ext>
-            </a:extLst>
-          </p:cNvPr>
-          <p:cNvPicPr>
-            <a:picLocks noGrp="1" noChangeAspect="1"/>
-          </p:cNvPicPr>
-          <p:nvPr>
-            <p:ph idx="1"/>
-          </p:nvPr>
-        </p:nvPicPr>
-        <p:blipFill>
-          <a:blip r:embed="rId2"/>
-          <a:stretch>
-            <a:fillRect/>
-          </a:stretch>
-        </p:blipFill>
-        <p:spPr>
-          <a:xfrm>
-            <a:off x="838200" y="1690688"/>
-            <a:ext cx="8267700" cy="4068441"/>
-          </a:xfrm>
-          <a:prstGeom prst="rect">
-            <a:avLst/>
-          </a:prstGeom>
-        </p:spPr>
-      </p:pic>
-      <p:sp>
-        <p:nvSpPr>
-          <p:cNvPr id="6" name="Arrow: Right 5">
-            <a:extLst>
-              <a:ext uri="{FF2B5EF4-FFF2-40B4-BE49-F238E27FC236}">
-                <a16:creationId xmlns:a16="http://schemas.microsoft.com/office/drawing/2014/main" id="{10F9B22F-8CAB-42C3-8E76-2603964AC17E}"/>
-              </a:ext>
-            </a:extLst>
-          </p:cNvPr>
-          <p:cNvSpPr/>
-          <p:nvPr/>
-        </p:nvSpPr>
-        <p:spPr>
-          <a:xfrm flipH="1">
-            <a:off x="7881870" y="1690688"/>
-            <a:ext cx="3000777" cy="1004552"/>
-          </a:xfrm>
-          <a:prstGeom prst="rightArrow">
-            <a:avLst/>
-          </a:prstGeom>
-        </p:spPr>
-        <p:style>
-          <a:lnRef idx="2">
-            <a:schemeClr val="accent1">
-              <a:shade val="50000"/>
-            </a:schemeClr>
-          </a:lnRef>
-          <a:fillRef idx="1">
-            <a:schemeClr val="accent1"/>
-          </a:fillRef>
-          <a:effectRef idx="0">
-            <a:schemeClr val="accent1"/>
-          </a:effectRef>
-          <a:fontRef idx="minor">
-            <a:schemeClr val="lt1"/>
-          </a:fontRef>
-        </p:style>
-        <p:txBody>
-          <a:bodyPr rtlCol="0" anchor="ctr"/>
-          <a:lstStyle/>
-          <a:p>
-            <a:pPr algn="ctr"/>
-            <a:r>
-              <a:rPr lang="en-US" b="1" dirty="0"/>
-              <a:t>Make Variable</a:t>
-            </a:r>
-          </a:p>
-        </p:txBody>
-      </p:sp>
-      <p:sp>
-        <p:nvSpPr>
-          <p:cNvPr id="7" name="Arrow: Right 6">
-            <a:extLst>
-              <a:ext uri="{FF2B5EF4-FFF2-40B4-BE49-F238E27FC236}">
-                <a16:creationId xmlns:a16="http://schemas.microsoft.com/office/drawing/2014/main" id="{58CEE2BA-034A-4636-BB27-3BE73689ABB3}"/>
-              </a:ext>
-            </a:extLst>
-          </p:cNvPr>
-          <p:cNvSpPr/>
-          <p:nvPr/>
-        </p:nvSpPr>
-        <p:spPr>
-          <a:xfrm flipH="1">
-            <a:off x="7881869" y="2856963"/>
-            <a:ext cx="3000777" cy="1004552"/>
-          </a:xfrm>
-          <a:prstGeom prst="rightArrow">
-            <a:avLst/>
-          </a:prstGeom>
-        </p:spPr>
-        <p:style>
-          <a:lnRef idx="2">
-            <a:schemeClr val="accent5">
-              <a:shade val="50000"/>
-            </a:schemeClr>
-          </a:lnRef>
-          <a:fillRef idx="1">
-            <a:schemeClr val="accent5"/>
-          </a:fillRef>
-          <a:effectRef idx="0">
-            <a:schemeClr val="accent5"/>
-          </a:effectRef>
-          <a:fontRef idx="minor">
-            <a:schemeClr val="lt1"/>
-          </a:fontRef>
-        </p:style>
-        <p:txBody>
-          <a:bodyPr rtlCol="0" anchor="ctr"/>
-          <a:lstStyle/>
-          <a:p>
-            <a:pPr algn="ctr"/>
-            <a:r>
-              <a:rPr lang="en-US" b="1" dirty="0"/>
-              <a:t>Set to this</a:t>
-            </a:r>
-          </a:p>
-        </p:txBody>
-      </p:sp>
-      <p:sp>
-        <p:nvSpPr>
-          <p:cNvPr id="8" name="Arrow: Right 7">
-            <a:extLst>
-              <a:ext uri="{FF2B5EF4-FFF2-40B4-BE49-F238E27FC236}">
-                <a16:creationId xmlns:a16="http://schemas.microsoft.com/office/drawing/2014/main" id="{E3C08378-80F5-41E6-A469-4D1B7DA10DCA}"/>
-              </a:ext>
-            </a:extLst>
-          </p:cNvPr>
-          <p:cNvSpPr/>
-          <p:nvPr/>
-        </p:nvSpPr>
-        <p:spPr>
-          <a:xfrm flipH="1">
-            <a:off x="7881869" y="4023238"/>
-            <a:ext cx="3000777" cy="1004552"/>
-          </a:xfrm>
-          <a:prstGeom prst="rightArrow">
-            <a:avLst/>
-          </a:prstGeom>
-        </p:spPr>
-        <p:style>
-          <a:lnRef idx="2">
-            <a:schemeClr val="accent5">
-              <a:shade val="50000"/>
-            </a:schemeClr>
-          </a:lnRef>
-          <a:fillRef idx="1">
-            <a:schemeClr val="accent5"/>
-          </a:fillRef>
-          <a:effectRef idx="0">
-            <a:schemeClr val="accent5"/>
-          </a:effectRef>
-          <a:fontRef idx="minor">
-            <a:schemeClr val="lt1"/>
-          </a:fontRef>
-        </p:style>
-        <p:txBody>
-          <a:bodyPr rtlCol="0" anchor="ctr"/>
-          <a:lstStyle/>
-          <a:p>
-            <a:pPr algn="ctr"/>
-            <a:r>
-              <a:rPr lang="en-US" b="1" dirty="0"/>
-              <a:t>Else this</a:t>
-            </a:r>
-          </a:p>
-        </p:txBody>
-      </p:sp>
-    </p:spTree>
-    <p:extLst>
-      <p:ext uri="{BB962C8B-B14F-4D97-AF65-F5344CB8AC3E}">
-        <p14:creationId xmlns:p14="http://schemas.microsoft.com/office/powerpoint/2010/main" val="1227012745"/>
       </p:ext>
     </p:extLst>
   </p:cSld>
@@ -6256,10 +6239,10 @@
       </p:grpSpPr>
       <p:sp>
         <p:nvSpPr>
-          <p:cNvPr id="4" name="Title 3">
-            <a:extLst>
-              <a:ext uri="{FF2B5EF4-FFF2-40B4-BE49-F238E27FC236}">
-                <a16:creationId xmlns:a16="http://schemas.microsoft.com/office/drawing/2014/main" id="{6A225B5C-E52F-4C28-8F32-57D72018763E}"/>
+          <p:cNvPr id="2" name="Title 1">
+            <a:extLst>
+              <a:ext uri="{FF2B5EF4-FFF2-40B4-BE49-F238E27FC236}">
+                <a16:creationId xmlns:a16="http://schemas.microsoft.com/office/drawing/2014/main" id="{8D77FCEC-2587-4B48-892B-3D902F737714}"/>
               </a:ext>
             </a:extLst>
           </p:cNvPr>
@@ -6277,40 +6260,194 @@
           <a:p>
             <a:r>
               <a:rPr lang="en-US" dirty="0"/>
-              <a:t>Where Do I Put Things?</a:t>
-            </a:r>
-          </a:p>
-        </p:txBody>
-      </p:sp>
-      <p:sp>
-        <p:nvSpPr>
-          <p:cNvPr id="5" name="Text Placeholder 4">
-            <a:extLst>
-              <a:ext uri="{FF2B5EF4-FFF2-40B4-BE49-F238E27FC236}">
-                <a16:creationId xmlns:a16="http://schemas.microsoft.com/office/drawing/2014/main" id="{C6A2D53E-2A76-4343-81E5-2A55E7D5BAF2}"/>
-              </a:ext>
-            </a:extLst>
-          </p:cNvPr>
-          <p:cNvSpPr>
-            <a:spLocks noGrp="1"/>
-          </p:cNvSpPr>
-          <p:nvPr>
-            <p:ph type="body" idx="1"/>
-          </p:nvPr>
-        </p:nvSpPr>
-        <p:spPr/>
-        <p:txBody>
-          <a:bodyPr/>
-          <a:lstStyle/>
-          <a:p>
-            <a:endParaRPr lang="en-US"/>
+              <a:t>if-else statements</a:t>
+            </a:r>
+          </a:p>
+        </p:txBody>
+      </p:sp>
+      <p:pic>
+        <p:nvPicPr>
+          <p:cNvPr id="4" name="Content Placeholder 3">
+            <a:extLst>
+              <a:ext uri="{FF2B5EF4-FFF2-40B4-BE49-F238E27FC236}">
+                <a16:creationId xmlns:a16="http://schemas.microsoft.com/office/drawing/2014/main" id="{9191AD96-AB6D-4D9C-9915-D83550876DAE}"/>
+              </a:ext>
+            </a:extLst>
+          </p:cNvPr>
+          <p:cNvPicPr>
+            <a:picLocks noGrp="1" noChangeAspect="1"/>
+          </p:cNvPicPr>
+          <p:nvPr>
+            <p:ph idx="1"/>
+          </p:nvPr>
+        </p:nvPicPr>
+        <p:blipFill>
+          <a:blip r:embed="rId2"/>
+          <a:stretch>
+            <a:fillRect/>
+          </a:stretch>
+        </p:blipFill>
+        <p:spPr>
+          <a:xfrm>
+            <a:off x="838200" y="1690688"/>
+            <a:ext cx="8267700" cy="4068441"/>
+          </a:xfrm>
+          <a:prstGeom prst="rect">
+            <a:avLst/>
+          </a:prstGeom>
+        </p:spPr>
+      </p:pic>
+      <p:sp>
+        <p:nvSpPr>
+          <p:cNvPr id="6" name="Arrow: Right 5">
+            <a:extLst>
+              <a:ext uri="{FF2B5EF4-FFF2-40B4-BE49-F238E27FC236}">
+                <a16:creationId xmlns:a16="http://schemas.microsoft.com/office/drawing/2014/main" id="{10F9B22F-8CAB-42C3-8E76-2603964AC17E}"/>
+              </a:ext>
+            </a:extLst>
+          </p:cNvPr>
+          <p:cNvSpPr/>
+          <p:nvPr/>
+        </p:nvSpPr>
+        <p:spPr>
+          <a:xfrm flipH="1">
+            <a:off x="7881870" y="1690688"/>
+            <a:ext cx="3000777" cy="1004552"/>
+          </a:xfrm>
+          <a:prstGeom prst="rightArrow">
+            <a:avLst/>
+          </a:prstGeom>
+        </p:spPr>
+        <p:style>
+          <a:lnRef idx="2">
+            <a:schemeClr val="accent1">
+              <a:shade val="50000"/>
+            </a:schemeClr>
+          </a:lnRef>
+          <a:fillRef idx="1">
+            <a:schemeClr val="accent1"/>
+          </a:fillRef>
+          <a:effectRef idx="0">
+            <a:schemeClr val="accent1"/>
+          </a:effectRef>
+          <a:fontRef idx="minor">
+            <a:schemeClr val="lt1"/>
+          </a:fontRef>
+        </p:style>
+        <p:txBody>
+          <a:bodyPr rtlCol="0" anchor="ctr"/>
+          <a:lstStyle/>
+          <a:p>
+            <a:pPr algn="ctr"/>
+            <a:r>
+              <a:rPr lang="en-US" b="1" dirty="0"/>
+              <a:t>Make Variable</a:t>
+            </a:r>
+          </a:p>
+        </p:txBody>
+      </p:sp>
+      <p:sp>
+        <p:nvSpPr>
+          <p:cNvPr id="7" name="Arrow: Right 6">
+            <a:extLst>
+              <a:ext uri="{FF2B5EF4-FFF2-40B4-BE49-F238E27FC236}">
+                <a16:creationId xmlns:a16="http://schemas.microsoft.com/office/drawing/2014/main" id="{58CEE2BA-034A-4636-BB27-3BE73689ABB3}"/>
+              </a:ext>
+            </a:extLst>
+          </p:cNvPr>
+          <p:cNvSpPr/>
+          <p:nvPr/>
+        </p:nvSpPr>
+        <p:spPr>
+          <a:xfrm flipH="1">
+            <a:off x="7881869" y="2856963"/>
+            <a:ext cx="3000777" cy="1004552"/>
+          </a:xfrm>
+          <a:prstGeom prst="rightArrow">
+            <a:avLst/>
+          </a:prstGeom>
+        </p:spPr>
+        <p:style>
+          <a:lnRef idx="2">
+            <a:schemeClr val="accent5">
+              <a:shade val="50000"/>
+            </a:schemeClr>
+          </a:lnRef>
+          <a:fillRef idx="1">
+            <a:schemeClr val="accent5"/>
+          </a:fillRef>
+          <a:effectRef idx="0">
+            <a:schemeClr val="accent5"/>
+          </a:effectRef>
+          <a:fontRef idx="minor">
+            <a:schemeClr val="lt1"/>
+          </a:fontRef>
+        </p:style>
+        <p:txBody>
+          <a:bodyPr rtlCol="0" anchor="ctr"/>
+          <a:lstStyle/>
+          <a:p>
+            <a:pPr algn="ctr"/>
+            <a:r>
+              <a:rPr lang="en-US" b="1" dirty="0"/>
+              <a:t>Set to this</a:t>
+            </a:r>
+          </a:p>
+        </p:txBody>
+      </p:sp>
+      <p:sp>
+        <p:nvSpPr>
+          <p:cNvPr id="8" name="Arrow: Right 7">
+            <a:extLst>
+              <a:ext uri="{FF2B5EF4-FFF2-40B4-BE49-F238E27FC236}">
+                <a16:creationId xmlns:a16="http://schemas.microsoft.com/office/drawing/2014/main" id="{E3C08378-80F5-41E6-A469-4D1B7DA10DCA}"/>
+              </a:ext>
+            </a:extLst>
+          </p:cNvPr>
+          <p:cNvSpPr/>
+          <p:nvPr/>
+        </p:nvSpPr>
+        <p:spPr>
+          <a:xfrm flipH="1">
+            <a:off x="7881869" y="4023238"/>
+            <a:ext cx="3000777" cy="1004552"/>
+          </a:xfrm>
+          <a:prstGeom prst="rightArrow">
+            <a:avLst/>
+          </a:prstGeom>
+        </p:spPr>
+        <p:style>
+          <a:lnRef idx="2">
+            <a:schemeClr val="accent5">
+              <a:shade val="50000"/>
+            </a:schemeClr>
+          </a:lnRef>
+          <a:fillRef idx="1">
+            <a:schemeClr val="accent5"/>
+          </a:fillRef>
+          <a:effectRef idx="0">
+            <a:schemeClr val="accent5"/>
+          </a:effectRef>
+          <a:fontRef idx="minor">
+            <a:schemeClr val="lt1"/>
+          </a:fontRef>
+        </p:style>
+        <p:txBody>
+          <a:bodyPr rtlCol="0" anchor="ctr"/>
+          <a:lstStyle/>
+          <a:p>
+            <a:pPr algn="ctr"/>
+            <a:r>
+              <a:rPr lang="en-US" b="1" dirty="0"/>
+              <a:t>Else this</a:t>
+            </a:r>
           </a:p>
         </p:txBody>
       </p:sp>
     </p:spTree>
     <p:extLst>
       <p:ext uri="{BB962C8B-B14F-4D97-AF65-F5344CB8AC3E}">
-        <p14:creationId xmlns:p14="http://schemas.microsoft.com/office/powerpoint/2010/main" val="4114916961"/>
+        <p14:creationId xmlns:p14="http://schemas.microsoft.com/office/powerpoint/2010/main" val="1227012745"/>
       </p:ext>
     </p:extLst>
   </p:cSld>
@@ -6342,7 +6479,7 @@
           <p:cNvPr id="4" name="Title 3">
             <a:extLst>
               <a:ext uri="{FF2B5EF4-FFF2-40B4-BE49-F238E27FC236}">
-                <a16:creationId xmlns:a16="http://schemas.microsoft.com/office/drawing/2014/main" id="{6DD3A7F9-D688-49C2-B5E4-C96EF0563C86}"/>
+                <a16:creationId xmlns:a16="http://schemas.microsoft.com/office/drawing/2014/main" id="{6A225B5C-E52F-4C28-8F32-57D72018763E}"/>
               </a:ext>
             </a:extLst>
           </p:cNvPr>
@@ -6360,102 +6497,40 @@
           <a:p>
             <a:r>
               <a:rPr lang="en-US" dirty="0"/>
-              <a:t>General Order</a:t>
-            </a:r>
-          </a:p>
-        </p:txBody>
-      </p:sp>
-      <p:sp>
-        <p:nvSpPr>
-          <p:cNvPr id="5" name="Content Placeholder 4">
-            <a:extLst>
-              <a:ext uri="{FF2B5EF4-FFF2-40B4-BE49-F238E27FC236}">
-                <a16:creationId xmlns:a16="http://schemas.microsoft.com/office/drawing/2014/main" id="{0F31C9F3-98D5-42F0-8822-0EDC61B37436}"/>
-              </a:ext>
-            </a:extLst>
-          </p:cNvPr>
-          <p:cNvSpPr>
-            <a:spLocks noGrp="1"/>
-          </p:cNvSpPr>
-          <p:nvPr>
-            <p:ph idx="1"/>
-          </p:nvPr>
-        </p:nvSpPr>
-        <p:spPr/>
-        <p:txBody>
-          <a:bodyPr/>
-          <a:lstStyle/>
-          <a:p>
-            <a:pPr marL="514350" indent="-514350">
-              <a:buFont typeface="+mj-lt"/>
-              <a:buAutoNum type="arabicPeriod"/>
-            </a:pPr>
-            <a:r>
-              <a:rPr lang="en-US" b="1" dirty="0"/>
-              <a:t>Math and calculations</a:t>
-            </a:r>
-          </a:p>
-          <a:p>
-            <a:pPr marL="514350" indent="-514350">
-              <a:buFont typeface="+mj-lt"/>
-              <a:buAutoNum type="arabicPeriod"/>
-            </a:pPr>
-            <a:r>
-              <a:rPr lang="en-US" b="1" dirty="0"/>
-              <a:t>Checks</a:t>
-            </a:r>
-            <a:r>
-              <a:rPr lang="en-US" dirty="0"/>
-              <a:t> </a:t>
-            </a:r>
-            <a:r>
-              <a:rPr lang="en-US" dirty="0" err="1"/>
-              <a:t>ie</a:t>
-            </a:r>
-            <a:r>
-              <a:rPr lang="en-US" dirty="0"/>
-              <a:t>. touching edge, </a:t>
-            </a:r>
-            <a:r>
-              <a:rPr lang="en-US" dirty="0" err="1"/>
-              <a:t>keydown</a:t>
-            </a:r>
-            <a:r>
-              <a:rPr lang="en-US" dirty="0"/>
-              <a:t>, </a:t>
-            </a:r>
-            <a:r>
-              <a:rPr lang="en-US" dirty="0" err="1"/>
-              <a:t>etc</a:t>
-            </a:r>
-            <a:endParaRPr lang="en-US" dirty="0"/>
-          </a:p>
-          <a:p>
-            <a:pPr marL="514350" indent="-514350">
-              <a:buFont typeface="+mj-lt"/>
-              <a:buAutoNum type="arabicPeriod"/>
-            </a:pPr>
-            <a:r>
-              <a:rPr lang="en-US" b="1" dirty="0"/>
-              <a:t>Drawing</a:t>
-            </a:r>
-          </a:p>
-          <a:p>
-            <a:pPr marL="514350" indent="-514350">
-              <a:buFont typeface="+mj-lt"/>
-              <a:buAutoNum type="arabicPeriod"/>
-            </a:pPr>
-            <a:r>
-              <a:rPr lang="en-US" b="1" dirty="0"/>
-              <a:t>Resetting checks</a:t>
-            </a:r>
+              <a:t>Where Do I Put Things?</a:t>
+            </a:r>
+          </a:p>
+        </p:txBody>
+      </p:sp>
+      <p:sp>
+        <p:nvSpPr>
+          <p:cNvPr id="5" name="Text Placeholder 4">
+            <a:extLst>
+              <a:ext uri="{FF2B5EF4-FFF2-40B4-BE49-F238E27FC236}">
+                <a16:creationId xmlns:a16="http://schemas.microsoft.com/office/drawing/2014/main" id="{C6A2D53E-2A76-4343-81E5-2A55E7D5BAF2}"/>
+              </a:ext>
+            </a:extLst>
+          </p:cNvPr>
+          <p:cNvSpPr>
+            <a:spLocks noGrp="1"/>
+          </p:cNvSpPr>
+          <p:nvPr>
+            <p:ph type="body" idx="1"/>
+          </p:nvPr>
+        </p:nvSpPr>
+        <p:spPr/>
+        <p:txBody>
+          <a:bodyPr/>
+          <a:lstStyle/>
+          <a:p>
+            <a:endParaRPr lang="en-US"/>
           </a:p>
         </p:txBody>
       </p:sp>
     </p:spTree>
     <p:extLst>
       <p:ext uri="{BB962C8B-B14F-4D97-AF65-F5344CB8AC3E}">
-        <p14:creationId xmlns:p14="http://schemas.microsoft.com/office/powerpoint/2010/main" val="3888495006"/>
+        <p14:creationId xmlns:p14="http://schemas.microsoft.com/office/powerpoint/2010/main" val="4114916961"/>
       </p:ext>
     </p:extLst>
   </p:cSld>
@@ -6484,10 +6559,10 @@
       </p:grpSpPr>
       <p:sp>
         <p:nvSpPr>
-          <p:cNvPr id="2" name="Title 1">
-            <a:extLst>
-              <a:ext uri="{FF2B5EF4-FFF2-40B4-BE49-F238E27FC236}">
-                <a16:creationId xmlns:a16="http://schemas.microsoft.com/office/drawing/2014/main" id="{63497FC8-929D-4939-A665-C086EDFAFBD9}"/>
+          <p:cNvPr id="4" name="Title 3">
+            <a:extLst>
+              <a:ext uri="{FF2B5EF4-FFF2-40B4-BE49-F238E27FC236}">
+                <a16:creationId xmlns:a16="http://schemas.microsoft.com/office/drawing/2014/main" id="{6DD3A7F9-D688-49C2-B5E4-C96EF0563C86}"/>
               </a:ext>
             </a:extLst>
           </p:cNvPr>
@@ -6505,17 +6580,17 @@
           <a:p>
             <a:r>
               <a:rPr lang="en-US" dirty="0"/>
-              <a:t>Code that will be used more than once:</a:t>
-            </a:r>
-          </a:p>
-        </p:txBody>
-      </p:sp>
-      <p:sp>
-        <p:nvSpPr>
-          <p:cNvPr id="3" name="Content Placeholder 2">
-            <a:extLst>
-              <a:ext uri="{FF2B5EF4-FFF2-40B4-BE49-F238E27FC236}">
-                <a16:creationId xmlns:a16="http://schemas.microsoft.com/office/drawing/2014/main" id="{F895AE24-4222-4C07-8909-A64F7D641C1E}"/>
+              <a:t>General Order</a:t>
+            </a:r>
+          </a:p>
+        </p:txBody>
+      </p:sp>
+      <p:sp>
+        <p:nvSpPr>
+          <p:cNvPr id="5" name="Content Placeholder 4">
+            <a:extLst>
+              <a:ext uri="{FF2B5EF4-FFF2-40B4-BE49-F238E27FC236}">
+                <a16:creationId xmlns:a16="http://schemas.microsoft.com/office/drawing/2014/main" id="{0F31C9F3-98D5-42F0-8822-0EDC61B37436}"/>
               </a:ext>
             </a:extLst>
           </p:cNvPr>
@@ -6531,34 +6606,68 @@
           <a:bodyPr/>
           <a:lstStyle/>
           <a:p>
-            <a:r>
-              <a:rPr lang="en-US" dirty="0"/>
-              <a:t>Put them in functions!</a:t>
-            </a:r>
-          </a:p>
-          <a:p>
+            <a:pPr marL="514350" indent="-514350">
+              <a:buFont typeface="+mj-lt"/>
+              <a:buAutoNum type="arabicPeriod"/>
+            </a:pPr>
+            <a:r>
+              <a:rPr lang="en-US" b="1" dirty="0"/>
+              <a:t>Math and calculations</a:t>
+            </a:r>
+          </a:p>
+          <a:p>
+            <a:pPr marL="514350" indent="-514350">
+              <a:buFont typeface="+mj-lt"/>
+              <a:buAutoNum type="arabicPeriod"/>
+            </a:pPr>
+            <a:r>
+              <a:rPr lang="en-US" b="1" dirty="0"/>
+              <a:t>Checks</a:t>
+            </a:r>
+            <a:r>
+              <a:rPr lang="en-US" dirty="0"/>
+              <a:t> </a:t>
+            </a:r>
+            <a:r>
+              <a:rPr lang="en-US" dirty="0" err="1"/>
+              <a:t>ie</a:t>
+            </a:r>
+            <a:r>
+              <a:rPr lang="en-US" dirty="0"/>
+              <a:t>. touching edge, </a:t>
+            </a:r>
+            <a:r>
+              <a:rPr lang="en-US" dirty="0" err="1"/>
+              <a:t>keydown</a:t>
+            </a:r>
+            <a:r>
+              <a:rPr lang="en-US" dirty="0"/>
+              <a:t>, </a:t>
+            </a:r>
+            <a:r>
+              <a:rPr lang="en-US" dirty="0" err="1"/>
+              <a:t>etc</a:t>
+            </a:r>
             <a:endParaRPr lang="en-US" dirty="0"/>
           </a:p>
           <a:p>
-            <a:r>
-              <a:rPr lang="en-US" dirty="0"/>
-              <a:t>Easier to maintain and easier to understand what is happening.</a:t>
-            </a:r>
-          </a:p>
-          <a:p>
-            <a:endParaRPr lang="en-US" dirty="0"/>
-          </a:p>
-          <a:p>
-            <a:r>
-              <a:rPr lang="en-US" dirty="0"/>
-              <a:t>A good goal is to repeat as few lines of code as possible.</a:t>
-            </a:r>
-          </a:p>
-          <a:p>
-            <a:pPr lvl="1"/>
-            <a:r>
-              <a:rPr lang="en-US" dirty="0"/>
-              <a:t>Different from writing as few lines as possible.</a:t>
+            <a:pPr marL="514350" indent="-514350">
+              <a:buFont typeface="+mj-lt"/>
+              <a:buAutoNum type="arabicPeriod"/>
+            </a:pPr>
+            <a:r>
+              <a:rPr lang="en-US" b="1" dirty="0"/>
+              <a:t>Drawing</a:t>
+            </a:r>
+          </a:p>
+          <a:p>
+            <a:pPr marL="514350" indent="-514350">
+              <a:buFont typeface="+mj-lt"/>
+              <a:buAutoNum type="arabicPeriod"/>
+            </a:pPr>
+            <a:r>
+              <a:rPr lang="en-US" b="1" dirty="0"/>
+              <a:t>Resetting checks</a:t>
             </a:r>
           </a:p>
         </p:txBody>
@@ -6566,7 +6675,7 @@
     </p:spTree>
     <p:extLst>
       <p:ext uri="{BB962C8B-B14F-4D97-AF65-F5344CB8AC3E}">
-        <p14:creationId xmlns:p14="http://schemas.microsoft.com/office/powerpoint/2010/main" val="193900878"/>
+        <p14:creationId xmlns:p14="http://schemas.microsoft.com/office/powerpoint/2010/main" val="3888495006"/>
       </p:ext>
     </p:extLst>
   </p:cSld>
@@ -6616,7 +6725,7 @@
           <a:p>
             <a:r>
               <a:rPr lang="en-US" dirty="0"/>
-              <a:t>Previous, in IMM120</a:t>
+              <a:t>Previously, in IMM120</a:t>
             </a:r>
           </a:p>
         </p:txBody>
@@ -6843,7 +6952,7 @@
           <p:cNvPr id="2" name="Title 1">
             <a:extLst>
               <a:ext uri="{FF2B5EF4-FFF2-40B4-BE49-F238E27FC236}">
-                <a16:creationId xmlns:a16="http://schemas.microsoft.com/office/drawing/2014/main" id="{D3AA79FD-6B8B-4DDF-BD61-BDB7DE8294E4}"/>
+                <a16:creationId xmlns:a16="http://schemas.microsoft.com/office/drawing/2014/main" id="{63497FC8-929D-4939-A665-C086EDFAFBD9}"/>
               </a:ext>
             </a:extLst>
           </p:cNvPr>
@@ -6861,35 +6970,60 @@
           <a:p>
             <a:r>
               <a:rPr lang="en-US" dirty="0"/>
-              <a:t>Your Health While You Code</a:t>
-            </a:r>
-          </a:p>
-        </p:txBody>
-      </p:sp>
-      <p:sp>
-        <p:nvSpPr>
-          <p:cNvPr id="3" name="Text Placeholder 2">
-            <a:extLst>
-              <a:ext uri="{FF2B5EF4-FFF2-40B4-BE49-F238E27FC236}">
-                <a16:creationId xmlns:a16="http://schemas.microsoft.com/office/drawing/2014/main" id="{85C9370F-8C56-4971-8769-D19422D04A9C}"/>
-              </a:ext>
-            </a:extLst>
-          </p:cNvPr>
-          <p:cNvSpPr>
-            <a:spLocks noGrp="1"/>
-          </p:cNvSpPr>
-          <p:nvPr>
-            <p:ph type="body" idx="1"/>
-          </p:nvPr>
-        </p:nvSpPr>
-        <p:spPr/>
-        <p:txBody>
-          <a:bodyPr/>
-          <a:lstStyle/>
-          <a:p>
-            <a:r>
-              <a:rPr lang="en-US" dirty="0"/>
-              <a:t>Since we’re talking meta…</a:t>
+              <a:t>Code that will be used more than once:</a:t>
+            </a:r>
+          </a:p>
+        </p:txBody>
+      </p:sp>
+      <p:sp>
+        <p:nvSpPr>
+          <p:cNvPr id="3" name="Content Placeholder 2">
+            <a:extLst>
+              <a:ext uri="{FF2B5EF4-FFF2-40B4-BE49-F238E27FC236}">
+                <a16:creationId xmlns:a16="http://schemas.microsoft.com/office/drawing/2014/main" id="{F895AE24-4222-4C07-8909-A64F7D641C1E}"/>
+              </a:ext>
+            </a:extLst>
+          </p:cNvPr>
+          <p:cNvSpPr>
+            <a:spLocks noGrp="1"/>
+          </p:cNvSpPr>
+          <p:nvPr>
+            <p:ph idx="1"/>
+          </p:nvPr>
+        </p:nvSpPr>
+        <p:spPr/>
+        <p:txBody>
+          <a:bodyPr/>
+          <a:lstStyle/>
+          <a:p>
+            <a:r>
+              <a:rPr lang="en-US" dirty="0"/>
+              <a:t>Put them in functions!</a:t>
+            </a:r>
+          </a:p>
+          <a:p>
+            <a:endParaRPr lang="en-US" dirty="0"/>
+          </a:p>
+          <a:p>
+            <a:r>
+              <a:rPr lang="en-US" dirty="0"/>
+              <a:t>Easier to maintain and easier to understand what is happening.</a:t>
+            </a:r>
+          </a:p>
+          <a:p>
+            <a:endParaRPr lang="en-US" dirty="0"/>
+          </a:p>
+          <a:p>
+            <a:r>
+              <a:rPr lang="en-US" dirty="0"/>
+              <a:t>A good goal is to repeat as few lines of code as possible.</a:t>
+            </a:r>
+          </a:p>
+          <a:p>
+            <a:pPr lvl="1"/>
+            <a:r>
+              <a:rPr lang="en-US" dirty="0"/>
+              <a:t>Different from writing as few lines as possible.</a:t>
             </a:r>
           </a:p>
         </p:txBody>
@@ -6897,7 +7031,7 @@
     </p:spTree>
     <p:extLst>
       <p:ext uri="{BB962C8B-B14F-4D97-AF65-F5344CB8AC3E}">
-        <p14:creationId xmlns:p14="http://schemas.microsoft.com/office/powerpoint/2010/main" val="2415957501"/>
+        <p14:creationId xmlns:p14="http://schemas.microsoft.com/office/powerpoint/2010/main" val="193900878"/>
       </p:ext>
     </p:extLst>
   </p:cSld>
@@ -6926,6 +7060,92 @@
       </p:grpSpPr>
       <p:sp>
         <p:nvSpPr>
+          <p:cNvPr id="2" name="Title 1">
+            <a:extLst>
+              <a:ext uri="{FF2B5EF4-FFF2-40B4-BE49-F238E27FC236}">
+                <a16:creationId xmlns:a16="http://schemas.microsoft.com/office/drawing/2014/main" id="{D3AA79FD-6B8B-4DDF-BD61-BDB7DE8294E4}"/>
+              </a:ext>
+            </a:extLst>
+          </p:cNvPr>
+          <p:cNvSpPr>
+            <a:spLocks noGrp="1"/>
+          </p:cNvSpPr>
+          <p:nvPr>
+            <p:ph type="title"/>
+          </p:nvPr>
+        </p:nvSpPr>
+        <p:spPr/>
+        <p:txBody>
+          <a:bodyPr/>
+          <a:lstStyle/>
+          <a:p>
+            <a:r>
+              <a:rPr lang="en-US" dirty="0"/>
+              <a:t>Your Health While You Code</a:t>
+            </a:r>
+          </a:p>
+        </p:txBody>
+      </p:sp>
+      <p:sp>
+        <p:nvSpPr>
+          <p:cNvPr id="3" name="Text Placeholder 2">
+            <a:extLst>
+              <a:ext uri="{FF2B5EF4-FFF2-40B4-BE49-F238E27FC236}">
+                <a16:creationId xmlns:a16="http://schemas.microsoft.com/office/drawing/2014/main" id="{85C9370F-8C56-4971-8769-D19422D04A9C}"/>
+              </a:ext>
+            </a:extLst>
+          </p:cNvPr>
+          <p:cNvSpPr>
+            <a:spLocks noGrp="1"/>
+          </p:cNvSpPr>
+          <p:nvPr>
+            <p:ph type="body" idx="1"/>
+          </p:nvPr>
+        </p:nvSpPr>
+        <p:spPr/>
+        <p:txBody>
+          <a:bodyPr/>
+          <a:lstStyle/>
+          <a:p>
+            <a:r>
+              <a:rPr lang="en-US" dirty="0"/>
+              <a:t>Since we’re talking meta…</a:t>
+            </a:r>
+          </a:p>
+        </p:txBody>
+      </p:sp>
+    </p:spTree>
+    <p:extLst>
+      <p:ext uri="{BB962C8B-B14F-4D97-AF65-F5344CB8AC3E}">
+        <p14:creationId xmlns:p14="http://schemas.microsoft.com/office/powerpoint/2010/main" val="2415957501"/>
+      </p:ext>
+    </p:extLst>
+  </p:cSld>
+  <p:clrMapOvr>
+    <a:masterClrMapping/>
+  </p:clrMapOvr>
+</p:sld>
+</file>
+
+<file path=ppt/slides/slide32.xml><?xml version="1.0" encoding="utf-8"?>
+<p:sld xmlns:a="http://schemas.openxmlformats.org/drawingml/2006/main" xmlns:r="http://schemas.openxmlformats.org/officeDocument/2006/relationships" xmlns:p="http://schemas.openxmlformats.org/presentationml/2006/main">
+  <p:cSld>
+    <p:spTree>
+      <p:nvGrpSpPr>
+        <p:cNvPr id="1" name=""/>
+        <p:cNvGrpSpPr/>
+        <p:nvPr/>
+      </p:nvGrpSpPr>
+      <p:grpSpPr>
+        <a:xfrm>
+          <a:off x="0" y="0"/>
+          <a:ext cx="0" cy="0"/>
+          <a:chOff x="0" y="0"/>
+          <a:chExt cx="0" cy="0"/>
+        </a:xfrm>
+      </p:grpSpPr>
+      <p:sp>
+        <p:nvSpPr>
           <p:cNvPr id="4" name="Title 3">
             <a:extLst>
               <a:ext uri="{FF2B5EF4-FFF2-40B4-BE49-F238E27FC236}">
@@ -7013,7 +7233,7 @@
 </p:sld>
 </file>
 
-<file path=ppt/slides/slide32.xml><?xml version="1.0" encoding="utf-8"?>
+<file path=ppt/slides/slide33.xml><?xml version="1.0" encoding="utf-8"?>
 <p:sld xmlns:a="http://schemas.openxmlformats.org/drawingml/2006/main" xmlns:r="http://schemas.openxmlformats.org/officeDocument/2006/relationships" xmlns:p="http://schemas.openxmlformats.org/presentationml/2006/main">
   <p:cSld>
     <p:spTree>
@@ -7204,7 +7424,7 @@
 </p:sld>
 </file>
 
-<file path=ppt/slides/slide33.xml><?xml version="1.0" encoding="utf-8"?>
+<file path=ppt/slides/slide34.xml><?xml version="1.0" encoding="utf-8"?>
 <p:sld xmlns:a="http://schemas.openxmlformats.org/drawingml/2006/main" xmlns:r="http://schemas.openxmlformats.org/officeDocument/2006/relationships" xmlns:p="http://schemas.openxmlformats.org/presentationml/2006/main">
   <p:cSld>
     <p:spTree>
@@ -7281,89 +7501,6 @@
 </p:sld>
 </file>
 
-<file path=ppt/slides/slide34.xml><?xml version="1.0" encoding="utf-8"?>
-<p:sld xmlns:a="http://schemas.openxmlformats.org/drawingml/2006/main" xmlns:r="http://schemas.openxmlformats.org/officeDocument/2006/relationships" xmlns:p="http://schemas.openxmlformats.org/presentationml/2006/main">
-  <p:cSld>
-    <p:spTree>
-      <p:nvGrpSpPr>
-        <p:cNvPr id="1" name=""/>
-        <p:cNvGrpSpPr/>
-        <p:nvPr/>
-      </p:nvGrpSpPr>
-      <p:grpSpPr>
-        <a:xfrm>
-          <a:off x="0" y="0"/>
-          <a:ext cx="0" cy="0"/>
-          <a:chOff x="0" y="0"/>
-          <a:chExt cx="0" cy="0"/>
-        </a:xfrm>
-      </p:grpSpPr>
-      <p:sp>
-        <p:nvSpPr>
-          <p:cNvPr id="2" name="Title 1">
-            <a:extLst>
-              <a:ext uri="{FF2B5EF4-FFF2-40B4-BE49-F238E27FC236}">
-                <a16:creationId xmlns:a16="http://schemas.microsoft.com/office/drawing/2014/main" id="{C0DA3FC6-0A69-4AE3-8BCD-3695A7AD06FC}"/>
-              </a:ext>
-            </a:extLst>
-          </p:cNvPr>
-          <p:cNvSpPr>
-            <a:spLocks noGrp="1"/>
-          </p:cNvSpPr>
-          <p:nvPr>
-            <p:ph type="title"/>
-          </p:nvPr>
-        </p:nvSpPr>
-        <p:spPr/>
-        <p:txBody>
-          <a:bodyPr/>
-          <a:lstStyle/>
-          <a:p>
-            <a:r>
-              <a:rPr lang="en-US" dirty="0"/>
-              <a:t>Debugging</a:t>
-            </a:r>
-          </a:p>
-        </p:txBody>
-      </p:sp>
-      <p:sp>
-        <p:nvSpPr>
-          <p:cNvPr id="3" name="Text Placeholder 2">
-            <a:extLst>
-              <a:ext uri="{FF2B5EF4-FFF2-40B4-BE49-F238E27FC236}">
-                <a16:creationId xmlns:a16="http://schemas.microsoft.com/office/drawing/2014/main" id="{C6192940-AA2D-4C7F-BBA6-AEB15962D0AA}"/>
-              </a:ext>
-            </a:extLst>
-          </p:cNvPr>
-          <p:cNvSpPr>
-            <a:spLocks noGrp="1"/>
-          </p:cNvSpPr>
-          <p:nvPr>
-            <p:ph type="body" idx="1"/>
-          </p:nvPr>
-        </p:nvSpPr>
-        <p:spPr/>
-        <p:txBody>
-          <a:bodyPr/>
-          <a:lstStyle/>
-          <a:p>
-            <a:endParaRPr lang="en-US"/>
-          </a:p>
-        </p:txBody>
-      </p:sp>
-    </p:spTree>
-    <p:extLst>
-      <p:ext uri="{BB962C8B-B14F-4D97-AF65-F5344CB8AC3E}">
-        <p14:creationId xmlns:p14="http://schemas.microsoft.com/office/powerpoint/2010/main" val="150891959"/>
-      </p:ext>
-    </p:extLst>
-  </p:cSld>
-  <p:clrMapOvr>
-    <a:masterClrMapping/>
-  </p:clrMapOvr>
-</p:sld>
-</file>
-
 <file path=ppt/slides/slide35.xml><?xml version="1.0" encoding="utf-8"?>
 <p:sld xmlns:a="http://schemas.openxmlformats.org/drawingml/2006/main" xmlns:r="http://schemas.openxmlformats.org/officeDocument/2006/relationships" xmlns:p="http://schemas.openxmlformats.org/presentationml/2006/main">
   <p:cSld>
@@ -7381,42 +7518,12 @@
           <a:chExt cx="0" cy="0"/>
         </a:xfrm>
       </p:grpSpPr>
-      <p:pic>
-        <p:nvPicPr>
-          <p:cNvPr id="2" name="Picture 1">
-            <a:extLst>
-              <a:ext uri="{FF2B5EF4-FFF2-40B4-BE49-F238E27FC236}">
-                <a16:creationId xmlns:a16="http://schemas.microsoft.com/office/drawing/2014/main" id="{E41253D5-CBA7-4AF9-9265-B93E3C18742D}"/>
-              </a:ext>
-            </a:extLst>
-          </p:cNvPr>
-          <p:cNvPicPr>
-            <a:picLocks noChangeAspect="1"/>
-          </p:cNvPicPr>
-          <p:nvPr/>
-        </p:nvPicPr>
-        <p:blipFill>
-          <a:blip r:embed="rId2"/>
-          <a:stretch>
-            <a:fillRect/>
-          </a:stretch>
-        </p:blipFill>
-        <p:spPr>
-          <a:xfrm>
-            <a:off x="5219700" y="2800350"/>
-            <a:ext cx="6972300" cy="4057650"/>
-          </a:xfrm>
-          <a:prstGeom prst="rect">
-            <a:avLst/>
-          </a:prstGeom>
-        </p:spPr>
-      </p:pic>
-      <p:sp>
-        <p:nvSpPr>
-          <p:cNvPr id="4" name="Title 3">
-            <a:extLst>
-              <a:ext uri="{FF2B5EF4-FFF2-40B4-BE49-F238E27FC236}">
-                <a16:creationId xmlns:a16="http://schemas.microsoft.com/office/drawing/2014/main" id="{AC275133-9883-45F0-83A6-ED3D97464C80}"/>
+      <p:sp>
+        <p:nvSpPr>
+          <p:cNvPr id="2" name="Title 1">
+            <a:extLst>
+              <a:ext uri="{FF2B5EF4-FFF2-40B4-BE49-F238E27FC236}">
+                <a16:creationId xmlns:a16="http://schemas.microsoft.com/office/drawing/2014/main" id="{C0DA3FC6-0A69-4AE3-8BCD-3695A7AD06FC}"/>
               </a:ext>
             </a:extLst>
           </p:cNvPr>
@@ -7434,68 +7541,7 @@
           <a:p>
             <a:r>
               <a:rPr lang="en-US" dirty="0"/>
-              <a:t>Remember Your Tools</a:t>
-            </a:r>
-          </a:p>
-        </p:txBody>
-      </p:sp>
-      <p:sp>
-        <p:nvSpPr>
-          <p:cNvPr id="5" name="Content Placeholder 4">
-            <a:extLst>
-              <a:ext uri="{FF2B5EF4-FFF2-40B4-BE49-F238E27FC236}">
-                <a16:creationId xmlns:a16="http://schemas.microsoft.com/office/drawing/2014/main" id="{1229918F-BECF-4AAC-AFE9-DABDCAB3332E}"/>
-              </a:ext>
-            </a:extLst>
-          </p:cNvPr>
-          <p:cNvSpPr>
-            <a:spLocks noGrp="1"/>
-          </p:cNvSpPr>
-          <p:nvPr>
-            <p:ph idx="1"/>
-          </p:nvPr>
-        </p:nvSpPr>
-        <p:spPr/>
-        <p:txBody>
-          <a:bodyPr/>
-          <a:lstStyle/>
-          <a:p>
-            <a:r>
-              <a:rPr lang="en-US" b="1" i="1" dirty="0"/>
-              <a:t>print() </a:t>
-            </a:r>
-            <a:r>
-              <a:rPr lang="en-US" dirty="0"/>
-              <a:t>to report the value of any variable</a:t>
-            </a:r>
-          </a:p>
-          <a:p>
-            <a:r>
-              <a:rPr lang="en-US" b="1" i="1" dirty="0" err="1"/>
-              <a:t>Codepen’s</a:t>
-            </a:r>
-            <a:r>
-              <a:rPr lang="en-US" b="1" i="1" dirty="0"/>
-              <a:t> red alert</a:t>
-            </a:r>
-          </a:p>
-          <a:p>
-            <a:r>
-              <a:rPr lang="en-US" b="1" i="1" dirty="0"/>
-              <a:t>Browser Console</a:t>
-            </a:r>
-          </a:p>
-          <a:p>
-            <a:pPr lvl="1"/>
-            <a:r>
-              <a:rPr lang="en-US" dirty="0"/>
-              <a:t>Inspect Element, click Console</a:t>
-            </a:r>
-          </a:p>
-          <a:p>
-            <a:r>
-              <a:rPr lang="en-US" b="1" i="1" dirty="0"/>
-              <a:t>Tidying your code</a:t>
+              <a:t>Debugging</a:t>
             </a:r>
           </a:p>
         </p:txBody>
@@ -7503,7 +7549,7 @@
     </p:spTree>
     <p:extLst>
       <p:ext uri="{BB962C8B-B14F-4D97-AF65-F5344CB8AC3E}">
-        <p14:creationId xmlns:p14="http://schemas.microsoft.com/office/powerpoint/2010/main" val="2896654772"/>
+        <p14:creationId xmlns:p14="http://schemas.microsoft.com/office/powerpoint/2010/main" val="150891959"/>
       </p:ext>
     </p:extLst>
   </p:cSld>
@@ -7530,6 +7576,155 @@
           <a:chExt cx="0" cy="0"/>
         </a:xfrm>
       </p:grpSpPr>
+      <p:pic>
+        <p:nvPicPr>
+          <p:cNvPr id="2" name="Picture 1">
+            <a:extLst>
+              <a:ext uri="{FF2B5EF4-FFF2-40B4-BE49-F238E27FC236}">
+                <a16:creationId xmlns:a16="http://schemas.microsoft.com/office/drawing/2014/main" id="{E41253D5-CBA7-4AF9-9265-B93E3C18742D}"/>
+              </a:ext>
+            </a:extLst>
+          </p:cNvPr>
+          <p:cNvPicPr>
+            <a:picLocks noChangeAspect="1"/>
+          </p:cNvPicPr>
+          <p:nvPr/>
+        </p:nvPicPr>
+        <p:blipFill>
+          <a:blip r:embed="rId2"/>
+          <a:stretch>
+            <a:fillRect/>
+          </a:stretch>
+        </p:blipFill>
+        <p:spPr>
+          <a:xfrm>
+            <a:off x="5219700" y="2800350"/>
+            <a:ext cx="6972300" cy="4057650"/>
+          </a:xfrm>
+          <a:prstGeom prst="rect">
+            <a:avLst/>
+          </a:prstGeom>
+        </p:spPr>
+      </p:pic>
+      <p:sp>
+        <p:nvSpPr>
+          <p:cNvPr id="4" name="Title 3">
+            <a:extLst>
+              <a:ext uri="{FF2B5EF4-FFF2-40B4-BE49-F238E27FC236}">
+                <a16:creationId xmlns:a16="http://schemas.microsoft.com/office/drawing/2014/main" id="{AC275133-9883-45F0-83A6-ED3D97464C80}"/>
+              </a:ext>
+            </a:extLst>
+          </p:cNvPr>
+          <p:cNvSpPr>
+            <a:spLocks noGrp="1"/>
+          </p:cNvSpPr>
+          <p:nvPr>
+            <p:ph type="title"/>
+          </p:nvPr>
+        </p:nvSpPr>
+        <p:spPr/>
+        <p:txBody>
+          <a:bodyPr/>
+          <a:lstStyle/>
+          <a:p>
+            <a:r>
+              <a:rPr lang="en-US" dirty="0"/>
+              <a:t>Remember Your Tools</a:t>
+            </a:r>
+          </a:p>
+        </p:txBody>
+      </p:sp>
+      <p:sp>
+        <p:nvSpPr>
+          <p:cNvPr id="5" name="Content Placeholder 4">
+            <a:extLst>
+              <a:ext uri="{FF2B5EF4-FFF2-40B4-BE49-F238E27FC236}">
+                <a16:creationId xmlns:a16="http://schemas.microsoft.com/office/drawing/2014/main" id="{1229918F-BECF-4AAC-AFE9-DABDCAB3332E}"/>
+              </a:ext>
+            </a:extLst>
+          </p:cNvPr>
+          <p:cNvSpPr>
+            <a:spLocks noGrp="1"/>
+          </p:cNvSpPr>
+          <p:nvPr>
+            <p:ph idx="1"/>
+          </p:nvPr>
+        </p:nvSpPr>
+        <p:spPr/>
+        <p:txBody>
+          <a:bodyPr/>
+          <a:lstStyle/>
+          <a:p>
+            <a:r>
+              <a:rPr lang="en-US" b="1" i="1" dirty="0"/>
+              <a:t>print() </a:t>
+            </a:r>
+            <a:r>
+              <a:rPr lang="en-US" dirty="0"/>
+              <a:t>to report the value of any variable</a:t>
+            </a:r>
+          </a:p>
+          <a:p>
+            <a:r>
+              <a:rPr lang="en-US" b="1" i="1" dirty="0" err="1"/>
+              <a:t>Codepen’s</a:t>
+            </a:r>
+            <a:r>
+              <a:rPr lang="en-US" b="1" i="1" dirty="0"/>
+              <a:t> red alert</a:t>
+            </a:r>
+          </a:p>
+          <a:p>
+            <a:r>
+              <a:rPr lang="en-US" b="1" i="1" u="sng" dirty="0"/>
+              <a:t>Browser Console</a:t>
+            </a:r>
+          </a:p>
+          <a:p>
+            <a:pPr lvl="1"/>
+            <a:r>
+              <a:rPr lang="en-US" dirty="0"/>
+              <a:t>Inspect Element, click Console</a:t>
+            </a:r>
+          </a:p>
+          <a:p>
+            <a:r>
+              <a:rPr lang="en-US" b="1" i="1" dirty="0"/>
+              <a:t>Tidying your code</a:t>
+            </a:r>
+          </a:p>
+        </p:txBody>
+      </p:sp>
+    </p:spTree>
+    <p:extLst>
+      <p:ext uri="{BB962C8B-B14F-4D97-AF65-F5344CB8AC3E}">
+        <p14:creationId xmlns:p14="http://schemas.microsoft.com/office/powerpoint/2010/main" val="2896654772"/>
+      </p:ext>
+    </p:extLst>
+  </p:cSld>
+  <p:clrMapOvr>
+    <a:masterClrMapping/>
+  </p:clrMapOvr>
+</p:sld>
+</file>
+
+<file path=ppt/slides/slide37.xml><?xml version="1.0" encoding="utf-8"?>
+<p:sld xmlns:a="http://schemas.openxmlformats.org/drawingml/2006/main" xmlns:r="http://schemas.openxmlformats.org/officeDocument/2006/relationships" xmlns:p="http://schemas.openxmlformats.org/presentationml/2006/main">
+  <p:cSld>
+    <p:spTree>
+      <p:nvGrpSpPr>
+        <p:cNvPr id="1" name=""/>
+        <p:cNvGrpSpPr/>
+        <p:nvPr/>
+      </p:nvGrpSpPr>
+      <p:grpSpPr>
+        <a:xfrm>
+          <a:off x="0" y="0"/>
+          <a:ext cx="0" cy="0"/>
+          <a:chOff x="0" y="0"/>
+          <a:chExt cx="0" cy="0"/>
+        </a:xfrm>
+      </p:grpSpPr>
       <p:sp>
         <p:nvSpPr>
           <p:cNvPr id="5" name="Content Placeholder 4">
@@ -7649,158 +7844,6 @@
 </p:sld>
 </file>
 
-<file path=ppt/slides/slide37.xml><?xml version="1.0" encoding="utf-8"?>
-<p:sld xmlns:a="http://schemas.openxmlformats.org/drawingml/2006/main" xmlns:r="http://schemas.openxmlformats.org/officeDocument/2006/relationships" xmlns:p="http://schemas.openxmlformats.org/presentationml/2006/main">
-  <p:cSld>
-    <p:spTree>
-      <p:nvGrpSpPr>
-        <p:cNvPr id="1" name=""/>
-        <p:cNvGrpSpPr/>
-        <p:nvPr/>
-      </p:nvGrpSpPr>
-      <p:grpSpPr>
-        <a:xfrm>
-          <a:off x="0" y="0"/>
-          <a:ext cx="0" cy="0"/>
-          <a:chOff x="0" y="0"/>
-          <a:chExt cx="0" cy="0"/>
-        </a:xfrm>
-      </p:grpSpPr>
-      <p:sp>
-        <p:nvSpPr>
-          <p:cNvPr id="2" name="Title 1">
-            <a:extLst>
-              <a:ext uri="{FF2B5EF4-FFF2-40B4-BE49-F238E27FC236}">
-                <a16:creationId xmlns:a16="http://schemas.microsoft.com/office/drawing/2014/main" id="{4A00CEAD-F00E-46C0-85DE-2AE8A4CE0852}"/>
-              </a:ext>
-            </a:extLst>
-          </p:cNvPr>
-          <p:cNvSpPr>
-            <a:spLocks noGrp="1"/>
-          </p:cNvSpPr>
-          <p:nvPr>
-            <p:ph type="title"/>
-          </p:nvPr>
-        </p:nvSpPr>
-        <p:spPr/>
-        <p:txBody>
-          <a:bodyPr/>
-          <a:lstStyle/>
-          <a:p>
-            <a:r>
-              <a:rPr lang="en-US" dirty="0"/>
-              <a:t>Rubber Duck Debugging</a:t>
-            </a:r>
-          </a:p>
-        </p:txBody>
-      </p:sp>
-      <p:sp>
-        <p:nvSpPr>
-          <p:cNvPr id="3" name="Content Placeholder 2">
-            <a:extLst>
-              <a:ext uri="{FF2B5EF4-FFF2-40B4-BE49-F238E27FC236}">
-                <a16:creationId xmlns:a16="http://schemas.microsoft.com/office/drawing/2014/main" id="{8FAE50CD-ED28-4A5D-94C7-133AB99E6C8A}"/>
-              </a:ext>
-            </a:extLst>
-          </p:cNvPr>
-          <p:cNvSpPr>
-            <a:spLocks noGrp="1"/>
-          </p:cNvSpPr>
-          <p:nvPr>
-            <p:ph idx="1"/>
-          </p:nvPr>
-        </p:nvSpPr>
-        <p:spPr>
-          <a:xfrm>
-            <a:off x="838200" y="1825625"/>
-            <a:ext cx="10515600" cy="4351338"/>
-          </a:xfrm>
-        </p:spPr>
-        <p:txBody>
-          <a:bodyPr>
-            <a:normAutofit fontScale="85000" lnSpcReduction="10000"/>
-          </a:bodyPr>
-          <a:lstStyle/>
-          <a:p>
-            <a:pPr marL="0" indent="0" fontAlgn="base">
-              <a:buNone/>
-            </a:pPr>
-            <a:r>
-              <a:rPr lang="en-US" dirty="0"/>
-              <a:t>The rubber duck debugging method is as follows:</a:t>
-            </a:r>
-          </a:p>
-          <a:p>
-            <a:pPr marL="514350" indent="-514350" fontAlgn="base">
-              <a:buFont typeface="+mj-lt"/>
-              <a:buAutoNum type="arabicPeriod"/>
-            </a:pPr>
-            <a:r>
-              <a:rPr lang="en-US" dirty="0"/>
-              <a:t>Beg, borrow, steal, buy, fabricate or otherwise obtain a rubber duck (bathtub variety).</a:t>
-            </a:r>
-          </a:p>
-          <a:p>
-            <a:pPr marL="514350" indent="-514350" fontAlgn="base">
-              <a:buFont typeface="+mj-lt"/>
-              <a:buAutoNum type="arabicPeriod"/>
-            </a:pPr>
-            <a:r>
-              <a:rPr lang="en-US" dirty="0"/>
-              <a:t>Place rubber duck on desk and inform it you are just going to go over some code with it, if that’s all right.</a:t>
-            </a:r>
-          </a:p>
-          <a:p>
-            <a:pPr marL="514350" indent="-514350" fontAlgn="base">
-              <a:buFont typeface="+mj-lt"/>
-              <a:buAutoNum type="arabicPeriod"/>
-            </a:pPr>
-            <a:r>
-              <a:rPr lang="en-US" dirty="0"/>
-              <a:t>Explain to the duck what your code is supposed to do, and then go into detail and explain your code line by line.</a:t>
-            </a:r>
-          </a:p>
-          <a:p>
-            <a:pPr marL="514350" indent="-514350" fontAlgn="base">
-              <a:buFont typeface="+mj-lt"/>
-              <a:buAutoNum type="arabicPeriod"/>
-            </a:pPr>
-            <a:r>
-              <a:rPr lang="en-US" dirty="0"/>
-              <a:t>At some point you will tell the duck what you are doing next and then realize that that is not in fact what you are actually doing. The duck will sit there serenely, happy in the knowledge that it has helped you on your way.</a:t>
-            </a:r>
-          </a:p>
-          <a:p>
-            <a:pPr marL="0" indent="0" fontAlgn="base">
-              <a:buNone/>
-            </a:pPr>
-            <a:r>
-              <a:rPr lang="en-US" b="1" i="1" dirty="0"/>
-              <a:t>Note</a:t>
-            </a:r>
-            <a:r>
-              <a:rPr lang="en-US" i="1" dirty="0"/>
-              <a:t>: In a pinch a coworker might be able to substitute for the duck, however, it is often preferred to confide mistakes to the duck instead of your coworker.</a:t>
-            </a:r>
-          </a:p>
-          <a:p>
-            <a:endParaRPr lang="en-US" dirty="0"/>
-          </a:p>
-        </p:txBody>
-      </p:sp>
-    </p:spTree>
-    <p:extLst>
-      <p:ext uri="{BB962C8B-B14F-4D97-AF65-F5344CB8AC3E}">
-        <p14:creationId xmlns:p14="http://schemas.microsoft.com/office/powerpoint/2010/main" val="3399730339"/>
-      </p:ext>
-    </p:extLst>
-  </p:cSld>
-  <p:clrMapOvr>
-    <a:masterClrMapping/>
-  </p:clrMapOvr>
-</p:sld>
-</file>
-
 <file path=ppt/slides/slide38.xml><?xml version="1.0" encoding="utf-8"?>
 <p:sld xmlns:a="http://schemas.openxmlformats.org/drawingml/2006/main" xmlns:r="http://schemas.openxmlformats.org/officeDocument/2006/relationships" xmlns:p="http://schemas.openxmlformats.org/presentationml/2006/main">
   <p:cSld>
@@ -7841,7 +7884,7 @@
           <a:p>
             <a:r>
               <a:rPr lang="en-US" dirty="0"/>
-              <a:t>Rubber Duck Debugging -  FAQ</a:t>
+              <a:t>Rubber Duck Debugging</a:t>
             </a:r>
           </a:p>
         </p:txBody>
@@ -7862,122 +7905,88 @@
             <p:ph idx="1"/>
           </p:nvPr>
         </p:nvSpPr>
-        <p:spPr/>
+        <p:spPr>
+          <a:xfrm>
+            <a:off x="838200" y="1825625"/>
+            <a:ext cx="10515600" cy="4351338"/>
+          </a:xfrm>
+        </p:spPr>
         <p:txBody>
           <a:bodyPr>
-            <a:normAutofit fontScale="92500" lnSpcReduction="10000"/>
+            <a:normAutofit fontScale="85000" lnSpcReduction="10000"/>
           </a:bodyPr>
           <a:lstStyle/>
           <a:p>
-            <a:pPr fontAlgn="base"/>
-            <a:r>
-              <a:rPr lang="en-US" b="1" dirty="0"/>
-              <a:t>If ducks are so smart, why don’t we just let the ducks do all the work?</a:t>
-            </a:r>
-            <a:r>
-              <a:rPr lang="en-US" dirty="0"/>
-              <a:t> </a:t>
-            </a:r>
-          </a:p>
-          <a:p>
-            <a:pPr lvl="1" fontAlgn="base"/>
-            <a:r>
-              <a:rPr lang="en-US" dirty="0"/>
-              <a:t>It would be wonderful if this were true, but the fact is that most ducks prefer to take a mentoring role. There are a few ducks however that do choose to code, but these are the ducks that nobody hears about because they are selected for secret government projects that are highly classified in nature.</a:t>
-            </a:r>
-          </a:p>
-          <a:p>
-            <a:pPr fontAlgn="base"/>
-            <a:r>
-              <a:rPr lang="en-US" b="1" dirty="0"/>
-              <a:t>Where can I learn more about rubber duck debugging?</a:t>
-            </a:r>
-            <a:r>
-              <a:rPr lang="en-US" dirty="0"/>
-              <a:t> </a:t>
-            </a:r>
-          </a:p>
-          <a:p>
-            <a:pPr lvl="1" fontAlgn="base"/>
-            <a:r>
-              <a:rPr lang="en-US" dirty="0"/>
-              <a:t>More information can be found at </a:t>
-            </a:r>
-            <a:r>
-              <a:rPr lang="en-US" b="1" dirty="0">
-                <a:hlinkClick r:id="rId2" action="ppaction://hlinkfile"/>
-              </a:rPr>
-              <a:t>rubberduckdebugging.com</a:t>
-            </a:r>
-            <a:r>
-              <a:rPr lang="en-US" dirty="0"/>
-              <a:t>, </a:t>
-            </a:r>
-            <a:r>
-              <a:rPr lang="en-US" dirty="0">
-                <a:hlinkClick r:id="rId3"/>
-              </a:rPr>
-              <a:t>wikipedia.org</a:t>
-            </a:r>
-            <a:r>
-              <a:rPr lang="en-US" dirty="0"/>
-              <a:t>, </a:t>
-            </a:r>
-            <a:r>
-              <a:rPr lang="en-US" dirty="0">
-                <a:hlinkClick r:id="rId4"/>
-              </a:rPr>
-              <a:t>lists.ethernal.org</a:t>
-            </a:r>
-            <a:r>
-              <a:rPr lang="en-US" dirty="0"/>
-              <a:t>, and </a:t>
-            </a:r>
-            <a:r>
-              <a:rPr lang="en-US" dirty="0">
-                <a:hlinkClick r:id="rId5"/>
-              </a:rPr>
-              <a:t>zenhub.com</a:t>
-            </a:r>
-            <a:r>
-              <a:rPr lang="en-US" dirty="0"/>
-              <a:t>.</a:t>
-            </a:r>
-          </a:p>
-          <a:p>
-            <a:pPr fontAlgn="base"/>
-            <a:r>
-              <a:rPr lang="en-US" b="1" dirty="0"/>
-              <a:t>Where can I hire my own duck?</a:t>
-            </a:r>
-            <a:r>
-              <a:rPr lang="en-US" dirty="0"/>
-              <a:t> </a:t>
-            </a:r>
-          </a:p>
-          <a:p>
-            <a:pPr lvl="1" fontAlgn="base"/>
-            <a:r>
-              <a:rPr lang="en-US" dirty="0"/>
-              <a:t>Great question! </a:t>
-            </a:r>
-            <a:r>
-              <a:rPr lang="en-US" dirty="0">
-                <a:hlinkClick r:id="rId6"/>
-              </a:rPr>
-              <a:t>Amazon.com</a:t>
-            </a:r>
-            <a:r>
-              <a:rPr lang="en-US" dirty="0"/>
-              <a:t> hosts a wide selection of affordable ducks that have graduated with a technical degree from some of the world’s leading universities.</a:t>
-            </a:r>
+            <a:pPr marL="0" indent="0" fontAlgn="base">
+              <a:buNone/>
+            </a:pPr>
+            <a:r>
+              <a:rPr lang="en-US" dirty="0"/>
+              <a:t>The rubber duck debugging method is as follows:</a:t>
+            </a:r>
+          </a:p>
+          <a:p>
+            <a:pPr marL="514350" indent="-514350" fontAlgn="base">
+              <a:buFont typeface="+mj-lt"/>
+              <a:buAutoNum type="arabicPeriod"/>
+            </a:pPr>
+            <a:r>
+              <a:rPr lang="en-US" dirty="0"/>
+              <a:t>Beg, borrow, steal, buy, fabricate or otherwise obtain a rubber duck (bathtub variety).</a:t>
+            </a:r>
+          </a:p>
+          <a:p>
+            <a:pPr marL="514350" indent="-514350" fontAlgn="base">
+              <a:buFont typeface="+mj-lt"/>
+              <a:buAutoNum type="arabicPeriod"/>
+            </a:pPr>
+            <a:r>
+              <a:rPr lang="en-US" dirty="0"/>
+              <a:t>Place rubber duck on desk and inform it you are just going to go over some code with it, if that’s all right.</a:t>
+            </a:r>
+          </a:p>
+          <a:p>
+            <a:pPr marL="514350" indent="-514350" fontAlgn="base">
+              <a:buFont typeface="+mj-lt"/>
+              <a:buAutoNum type="arabicPeriod"/>
+            </a:pPr>
+            <a:r>
+              <a:rPr lang="en-US" dirty="0"/>
+              <a:t>Explain to the duck what your code is supposed to do, and then go into detail and explain your code line by line.</a:t>
+            </a:r>
+          </a:p>
+          <a:p>
+            <a:pPr marL="514350" indent="-514350" fontAlgn="base">
+              <a:buFont typeface="+mj-lt"/>
+              <a:buAutoNum type="arabicPeriod"/>
+            </a:pPr>
+            <a:r>
+              <a:rPr lang="en-US" dirty="0"/>
+              <a:t>At some point you will tell the duck what you are doing next and then realize that that is not in fact what you are actually doing. The duck will sit there serenely, happy in the knowledge that it has helped you on your way.</a:t>
+            </a:r>
+          </a:p>
+          <a:p>
+            <a:pPr marL="0" indent="0" fontAlgn="base">
+              <a:buNone/>
+            </a:pPr>
+            <a:r>
+              <a:rPr lang="en-US" b="1" i="1" dirty="0"/>
+              <a:t>Note</a:t>
+            </a:r>
+            <a:r>
+              <a:rPr lang="en-US" i="1" dirty="0"/>
+              <a:t>: In a pinch a coworker might be able to substitute for the duck, however, it is often preferred to confide mistakes to the duck instead of your coworker.</a:t>
+            </a:r>
+          </a:p>
+          <a:p>
+            <a:endParaRPr lang="en-US" dirty="0"/>
           </a:p>
         </p:txBody>
       </p:sp>
     </p:spTree>
     <p:extLst>
       <p:ext uri="{BB962C8B-B14F-4D97-AF65-F5344CB8AC3E}">
-        <p14:creationId xmlns:p14="http://schemas.microsoft.com/office/powerpoint/2010/main" val="2848061247"/>
+        <p14:creationId xmlns:p14="http://schemas.microsoft.com/office/powerpoint/2010/main" val="3399730339"/>
       </p:ext>
     </p:extLst>
   </p:cSld>
@@ -8006,10 +8015,10 @@
       </p:grpSpPr>
       <p:sp>
         <p:nvSpPr>
-          <p:cNvPr id="4" name="Title 3">
-            <a:extLst>
-              <a:ext uri="{FF2B5EF4-FFF2-40B4-BE49-F238E27FC236}">
-                <a16:creationId xmlns:a16="http://schemas.microsoft.com/office/drawing/2014/main" id="{D3E4806E-50E6-405B-A273-15D8A443A2DF}"/>
+          <p:cNvPr id="2" name="Title 1">
+            <a:extLst>
+              <a:ext uri="{FF2B5EF4-FFF2-40B4-BE49-F238E27FC236}">
+                <a16:creationId xmlns:a16="http://schemas.microsoft.com/office/drawing/2014/main" id="{4A00CEAD-F00E-46C0-85DE-2AE8A4CE0852}"/>
               </a:ext>
             </a:extLst>
           </p:cNvPr>
@@ -8025,73 +8034,137 @@
           <a:bodyPr/>
           <a:lstStyle/>
           <a:p>
+            <a:r>
+              <a:rPr lang="en-US" dirty="0"/>
+              <a:t>Rubber Duck Debugging -  FAQ</a:t>
+            </a:r>
+          </a:p>
+        </p:txBody>
+      </p:sp>
+      <p:sp>
+        <p:nvSpPr>
+          <p:cNvPr id="3" name="Content Placeholder 2">
+            <a:extLst>
+              <a:ext uri="{FF2B5EF4-FFF2-40B4-BE49-F238E27FC236}">
+                <a16:creationId xmlns:a16="http://schemas.microsoft.com/office/drawing/2014/main" id="{8FAE50CD-ED28-4A5D-94C7-133AB99E6C8A}"/>
+              </a:ext>
+            </a:extLst>
+          </p:cNvPr>
+          <p:cNvSpPr>
+            <a:spLocks noGrp="1"/>
+          </p:cNvSpPr>
+          <p:nvPr>
+            <p:ph idx="1"/>
+          </p:nvPr>
+        </p:nvSpPr>
+        <p:spPr/>
+        <p:txBody>
+          <a:bodyPr>
+            <a:normAutofit fontScale="92500" lnSpcReduction="10000"/>
+          </a:bodyPr>
+          <a:lstStyle/>
+          <a:p>
+            <a:pPr fontAlgn="base"/>
+            <a:r>
+              <a:rPr lang="en-US" b="1" dirty="0"/>
+              <a:t>If ducks are so smart, why don’t we just let the ducks do all the work?</a:t>
+            </a:r>
+            <a:r>
+              <a:rPr lang="en-US" dirty="0"/>
+              <a:t> </a:t>
+            </a:r>
+          </a:p>
+          <a:p>
+            <a:pPr lvl="1" fontAlgn="base"/>
+            <a:r>
+              <a:rPr lang="en-US" dirty="0"/>
+              <a:t>It would be wonderful if this were true, but the fact is that most ducks prefer to take a mentoring role. There are a few ducks however that do choose to code, but these are the ducks that nobody hears about because they are selected for secret government projects that are highly classified in nature.</a:t>
+            </a:r>
+          </a:p>
+          <a:p>
+            <a:pPr fontAlgn="base"/>
+            <a:r>
+              <a:rPr lang="en-US" b="1" dirty="0"/>
+              <a:t>Where can I learn more about rubber duck debugging?</a:t>
+            </a:r>
+            <a:r>
+              <a:rPr lang="en-US" dirty="0"/>
+              <a:t> </a:t>
+            </a:r>
+          </a:p>
+          <a:p>
+            <a:pPr lvl="1" fontAlgn="base"/>
+            <a:r>
+              <a:rPr lang="en-US" dirty="0"/>
+              <a:t>More information can be found at </a:t>
+            </a:r>
+            <a:r>
+              <a:rPr lang="en-US" b="1" dirty="0">
+                <a:hlinkClick r:id="rId2" action="ppaction://hlinkfile"/>
+              </a:rPr>
+              <a:t>rubberduckdebugging.com</a:t>
+            </a:r>
+            <a:r>
+              <a:rPr lang="en-US" dirty="0"/>
+              <a:t>, </a:t>
+            </a:r>
             <a:r>
               <a:rPr lang="en-US" dirty="0">
                 <a:hlinkClick r:id="rId3"/>
               </a:rPr>
-              <a:t>https://cdpn.io/e/ZXBrZw</a:t>
-            </a:r>
-            <a:r>
-              <a:rPr lang="en-US" dirty="0"/>
-              <a:t> </a:t>
-            </a:r>
-          </a:p>
-        </p:txBody>
-      </p:sp>
-      <p:sp>
-        <p:nvSpPr>
-          <p:cNvPr id="6" name="Text Placeholder 5">
-            <a:extLst>
-              <a:ext uri="{FF2B5EF4-FFF2-40B4-BE49-F238E27FC236}">
-                <a16:creationId xmlns:a16="http://schemas.microsoft.com/office/drawing/2014/main" id="{525BC88A-68F0-4F9A-8D81-B703A321CD05}"/>
-              </a:ext>
-            </a:extLst>
-          </p:cNvPr>
-          <p:cNvSpPr>
-            <a:spLocks noGrp="1"/>
-          </p:cNvSpPr>
-          <p:nvPr>
-            <p:ph type="body" idx="1"/>
-          </p:nvPr>
-        </p:nvSpPr>
-        <p:spPr>
-          <a:xfrm>
-            <a:off x="831850" y="4585607"/>
-            <a:ext cx="10515600" cy="1500187"/>
-          </a:xfrm>
-        </p:spPr>
-        <p:txBody>
-          <a:bodyPr/>
-          <a:lstStyle/>
-          <a:p>
+              <a:t>wikipedia.org</a:t>
+            </a:r>
+            <a:r>
+              <a:rPr lang="en-US" dirty="0"/>
+              <a:t>, </a:t>
+            </a:r>
+            <a:r>
+              <a:rPr lang="en-US" dirty="0">
+                <a:hlinkClick r:id="rId4"/>
+              </a:rPr>
+              <a:t>lists.ethernal.org</a:t>
+            </a:r>
+            <a:r>
+              <a:rPr lang="en-US" dirty="0"/>
+              <a:t>, and </a:t>
+            </a:r>
+            <a:r>
+              <a:rPr lang="en-US" dirty="0">
+                <a:hlinkClick r:id="rId5"/>
+              </a:rPr>
+              <a:t>zenhub.com</a:t>
+            </a:r>
+            <a:r>
+              <a:rPr lang="en-US" dirty="0"/>
+              <a:t>.</a:t>
+            </a:r>
+          </a:p>
+          <a:p>
+            <a:pPr fontAlgn="base"/>
             <a:r>
               <a:rPr lang="en-US" b="1" dirty="0"/>
-              <a:t>Debug Challenge</a:t>
-            </a:r>
-          </a:p>
-          <a:p>
-            <a:endParaRPr lang="en-US" dirty="0"/>
-          </a:p>
-          <a:p>
-            <a:r>
-              <a:rPr lang="en-US" dirty="0"/>
-              <a:t>There are 6 things wrong, some </a:t>
-            </a:r>
-            <a:r>
-              <a:rPr lang="en-US" b="1" dirty="0"/>
-              <a:t>semantic</a:t>
-            </a:r>
-            <a:r>
-              <a:rPr lang="en-US" dirty="0"/>
-              <a:t>, some </a:t>
-            </a:r>
-            <a:r>
-              <a:rPr lang="en-US" b="1" dirty="0"/>
-              <a:t>syntactic</a:t>
-            </a:r>
-            <a:r>
-              <a:rPr lang="en-US" dirty="0"/>
-              <a:t>. </a:t>
+              <a:t>Where can I hire my own duck?</a:t>
+            </a:r>
+            <a:r>
+              <a:rPr lang="en-US" dirty="0"/>
+              <a:t> </a:t>
+            </a:r>
+          </a:p>
+          <a:p>
+            <a:pPr lvl="1" fontAlgn="base"/>
+            <a:r>
+              <a:rPr lang="en-US" dirty="0"/>
+              <a:t>Great question! </a:t>
+            </a:r>
+            <a:r>
+              <a:rPr lang="en-US" dirty="0">
+                <a:hlinkClick r:id="rId6"/>
+              </a:rPr>
+              <a:t>Amazon.com</a:t>
+            </a:r>
+            <a:r>
+              <a:rPr lang="en-US" dirty="0"/>
+              <a:t> hosts a wide selection of affordable ducks that have graduated with a technical degree from some of the world’s leading universities.</a:t>
             </a:r>
           </a:p>
         </p:txBody>
@@ -8099,7 +8172,7 @@
     </p:spTree>
     <p:extLst>
       <p:ext uri="{BB962C8B-B14F-4D97-AF65-F5344CB8AC3E}">
-        <p14:creationId xmlns:p14="http://schemas.microsoft.com/office/powerpoint/2010/main" val="3834871370"/>
+        <p14:creationId xmlns:p14="http://schemas.microsoft.com/office/powerpoint/2010/main" val="2848061247"/>
       </p:ext>
     </p:extLst>
   </p:cSld>
@@ -8240,6 +8313,128 @@
 </file>
 
 <file path=ppt/slides/slide40.xml><?xml version="1.0" encoding="utf-8"?>
+<p:sld xmlns:a="http://schemas.openxmlformats.org/drawingml/2006/main" xmlns:r="http://schemas.openxmlformats.org/officeDocument/2006/relationships" xmlns:p="http://schemas.openxmlformats.org/presentationml/2006/main">
+  <p:cSld>
+    <p:spTree>
+      <p:nvGrpSpPr>
+        <p:cNvPr id="1" name=""/>
+        <p:cNvGrpSpPr/>
+        <p:nvPr/>
+      </p:nvGrpSpPr>
+      <p:grpSpPr>
+        <a:xfrm>
+          <a:off x="0" y="0"/>
+          <a:ext cx="0" cy="0"/>
+          <a:chOff x="0" y="0"/>
+          <a:chExt cx="0" cy="0"/>
+        </a:xfrm>
+      </p:grpSpPr>
+      <p:sp>
+        <p:nvSpPr>
+          <p:cNvPr id="4" name="Title 3">
+            <a:extLst>
+              <a:ext uri="{FF2B5EF4-FFF2-40B4-BE49-F238E27FC236}">
+                <a16:creationId xmlns:a16="http://schemas.microsoft.com/office/drawing/2014/main" id="{D3E4806E-50E6-405B-A273-15D8A443A2DF}"/>
+              </a:ext>
+            </a:extLst>
+          </p:cNvPr>
+          <p:cNvSpPr>
+            <a:spLocks noGrp="1"/>
+          </p:cNvSpPr>
+          <p:nvPr>
+            <p:ph type="title"/>
+          </p:nvPr>
+        </p:nvSpPr>
+        <p:spPr/>
+        <p:txBody>
+          <a:bodyPr/>
+          <a:lstStyle/>
+          <a:p>
+            <a:r>
+              <a:rPr lang="en-US" dirty="0">
+                <a:hlinkClick r:id="rId3"/>
+              </a:rPr>
+              <a:t>https://cdpn.io/e/ZXBrZw</a:t>
+            </a:r>
+            <a:r>
+              <a:rPr lang="en-US" dirty="0"/>
+              <a:t> </a:t>
+            </a:r>
+          </a:p>
+        </p:txBody>
+      </p:sp>
+      <p:sp>
+        <p:nvSpPr>
+          <p:cNvPr id="6" name="Text Placeholder 5">
+            <a:extLst>
+              <a:ext uri="{FF2B5EF4-FFF2-40B4-BE49-F238E27FC236}">
+                <a16:creationId xmlns:a16="http://schemas.microsoft.com/office/drawing/2014/main" id="{525BC88A-68F0-4F9A-8D81-B703A321CD05}"/>
+              </a:ext>
+            </a:extLst>
+          </p:cNvPr>
+          <p:cNvSpPr>
+            <a:spLocks noGrp="1"/>
+          </p:cNvSpPr>
+          <p:nvPr>
+            <p:ph type="body" idx="1"/>
+          </p:nvPr>
+        </p:nvSpPr>
+        <p:spPr>
+          <a:xfrm>
+            <a:off x="831850" y="4585607"/>
+            <a:ext cx="10515600" cy="1500187"/>
+          </a:xfrm>
+        </p:spPr>
+        <p:txBody>
+          <a:bodyPr/>
+          <a:lstStyle/>
+          <a:p>
+            <a:r>
+              <a:rPr lang="en-US" b="1" dirty="0"/>
+              <a:t>Debug Challenge</a:t>
+            </a:r>
+          </a:p>
+          <a:p>
+            <a:endParaRPr lang="en-US" dirty="0"/>
+          </a:p>
+          <a:p>
+            <a:r>
+              <a:rPr lang="en-US" dirty="0"/>
+              <a:t>There are 6 things wrong, some </a:t>
+            </a:r>
+            <a:r>
+              <a:rPr lang="en-US" b="1" dirty="0"/>
+              <a:t>semantic</a:t>
+            </a:r>
+            <a:r>
+              <a:rPr lang="en-US" dirty="0"/>
+              <a:t>, some </a:t>
+            </a:r>
+            <a:r>
+              <a:rPr lang="en-US" b="1" dirty="0"/>
+              <a:t>syntactic</a:t>
+            </a:r>
+            <a:r>
+              <a:rPr lang="en-US" dirty="0"/>
+              <a:t>. </a:t>
+            </a:r>
+          </a:p>
+        </p:txBody>
+      </p:sp>
+    </p:spTree>
+    <p:extLst>
+      <p:ext uri="{BB962C8B-B14F-4D97-AF65-F5344CB8AC3E}">
+        <p14:creationId xmlns:p14="http://schemas.microsoft.com/office/powerpoint/2010/main" val="3834871370"/>
+      </p:ext>
+    </p:extLst>
+  </p:cSld>
+  <p:clrMapOvr>
+    <a:masterClrMapping/>
+  </p:clrMapOvr>
+</p:sld>
+</file>
+
+<file path=ppt/slides/slide41.xml><?xml version="1.0" encoding="utf-8"?>
 <p:sld xmlns:a="http://schemas.openxmlformats.org/drawingml/2006/main" xmlns:r="http://schemas.openxmlformats.org/officeDocument/2006/relationships" xmlns:p="http://schemas.openxmlformats.org/presentationml/2006/main">
   <p:cSld>
     <p:spTree>
@@ -8351,89 +8546,6 @@
 </p:sld>
 </file>
 
-<file path=ppt/slides/slide41.xml><?xml version="1.0" encoding="utf-8"?>
-<p:sld xmlns:a="http://schemas.openxmlformats.org/drawingml/2006/main" xmlns:r="http://schemas.openxmlformats.org/officeDocument/2006/relationships" xmlns:p="http://schemas.openxmlformats.org/presentationml/2006/main">
-  <p:cSld>
-    <p:spTree>
-      <p:nvGrpSpPr>
-        <p:cNvPr id="1" name=""/>
-        <p:cNvGrpSpPr/>
-        <p:nvPr/>
-      </p:nvGrpSpPr>
-      <p:grpSpPr>
-        <a:xfrm>
-          <a:off x="0" y="0"/>
-          <a:ext cx="0" cy="0"/>
-          <a:chOff x="0" y="0"/>
-          <a:chExt cx="0" cy="0"/>
-        </a:xfrm>
-      </p:grpSpPr>
-      <p:sp>
-        <p:nvSpPr>
-          <p:cNvPr id="4" name="Title 3">
-            <a:extLst>
-              <a:ext uri="{FF2B5EF4-FFF2-40B4-BE49-F238E27FC236}">
-                <a16:creationId xmlns:a16="http://schemas.microsoft.com/office/drawing/2014/main" id="{0C215F8D-39AA-4135-9A82-433DA76556E6}"/>
-              </a:ext>
-            </a:extLst>
-          </p:cNvPr>
-          <p:cNvSpPr>
-            <a:spLocks noGrp="1"/>
-          </p:cNvSpPr>
-          <p:nvPr>
-            <p:ph type="title"/>
-          </p:nvPr>
-        </p:nvSpPr>
-        <p:spPr/>
-        <p:txBody>
-          <a:bodyPr/>
-          <a:lstStyle/>
-          <a:p>
-            <a:r>
-              <a:rPr lang="en-US" dirty="0"/>
-              <a:t>Text</a:t>
-            </a:r>
-          </a:p>
-        </p:txBody>
-      </p:sp>
-      <p:sp>
-        <p:nvSpPr>
-          <p:cNvPr id="5" name="Text Placeholder 4">
-            <a:extLst>
-              <a:ext uri="{FF2B5EF4-FFF2-40B4-BE49-F238E27FC236}">
-                <a16:creationId xmlns:a16="http://schemas.microsoft.com/office/drawing/2014/main" id="{93F9EB95-F350-47AF-915E-A79296AC623C}"/>
-              </a:ext>
-            </a:extLst>
-          </p:cNvPr>
-          <p:cNvSpPr>
-            <a:spLocks noGrp="1"/>
-          </p:cNvSpPr>
-          <p:nvPr>
-            <p:ph type="body" idx="1"/>
-          </p:nvPr>
-        </p:nvSpPr>
-        <p:spPr/>
-        <p:txBody>
-          <a:bodyPr/>
-          <a:lstStyle/>
-          <a:p>
-            <a:endParaRPr lang="en-US"/>
-          </a:p>
-        </p:txBody>
-      </p:sp>
-    </p:spTree>
-    <p:extLst>
-      <p:ext uri="{BB962C8B-B14F-4D97-AF65-F5344CB8AC3E}">
-        <p14:creationId xmlns:p14="http://schemas.microsoft.com/office/powerpoint/2010/main" val="796626276"/>
-      </p:ext>
-    </p:extLst>
-  </p:cSld>
-  <p:clrMapOvr>
-    <a:masterClrMapping/>
-  </p:clrMapOvr>
-</p:sld>
-</file>
-
 <file path=ppt/slides/slide42.xml><?xml version="1.0" encoding="utf-8"?>
 <p:sld xmlns:a="http://schemas.openxmlformats.org/drawingml/2006/main" xmlns:r="http://schemas.openxmlformats.org/officeDocument/2006/relationships" xmlns:p="http://schemas.openxmlformats.org/presentationml/2006/main">
   <p:cSld>
@@ -8453,10 +8565,10 @@
       </p:grpSpPr>
       <p:sp>
         <p:nvSpPr>
-          <p:cNvPr id="2" name="Title 1">
-            <a:extLst>
-              <a:ext uri="{FF2B5EF4-FFF2-40B4-BE49-F238E27FC236}">
-                <a16:creationId xmlns:a16="http://schemas.microsoft.com/office/drawing/2014/main" id="{6F2795D9-CC6E-4634-9F7C-497FCE2C2853}"/>
+          <p:cNvPr id="4" name="Title 3">
+            <a:extLst>
+              <a:ext uri="{FF2B5EF4-FFF2-40B4-BE49-F238E27FC236}">
+                <a16:creationId xmlns:a16="http://schemas.microsoft.com/office/drawing/2014/main" id="{0C215F8D-39AA-4135-9A82-433DA76556E6}"/>
               </a:ext>
             </a:extLst>
           </p:cNvPr>
@@ -8474,17 +8586,17 @@
           <a:p>
             <a:r>
               <a:rPr lang="en-US" dirty="0"/>
-              <a:t>Flappy Bird Score</a:t>
-            </a:r>
-          </a:p>
-        </p:txBody>
-      </p:sp>
-      <p:sp>
-        <p:nvSpPr>
-          <p:cNvPr id="3" name="Text Placeholder 2">
-            <a:extLst>
-              <a:ext uri="{FF2B5EF4-FFF2-40B4-BE49-F238E27FC236}">
-                <a16:creationId xmlns:a16="http://schemas.microsoft.com/office/drawing/2014/main" id="{A8BC1F26-A260-485D-8747-13D51E760762}"/>
+              <a:t>Text</a:t>
+            </a:r>
+          </a:p>
+        </p:txBody>
+      </p:sp>
+      <p:sp>
+        <p:nvSpPr>
+          <p:cNvPr id="5" name="Text Placeholder 4">
+            <a:extLst>
+              <a:ext uri="{FF2B5EF4-FFF2-40B4-BE49-F238E27FC236}">
+                <a16:creationId xmlns:a16="http://schemas.microsoft.com/office/drawing/2014/main" id="{93F9EB95-F350-47AF-915E-A79296AC623C}"/>
               </a:ext>
             </a:extLst>
           </p:cNvPr>
@@ -8500,29 +8612,14 @@
           <a:bodyPr/>
           <a:lstStyle/>
           <a:p>
-            <a:r>
-              <a:rPr lang="en-US" dirty="0">
-                <a:hlinkClick r:id="rId2"/>
-              </a:rPr>
-              <a:t>https://cdpn.io/e/veNQJo</a:t>
-            </a:r>
-            <a:endParaRPr lang="en-US" dirty="0"/>
-          </a:p>
-          <a:p>
-            <a:endParaRPr lang="en-US" dirty="0"/>
-          </a:p>
-          <a:p>
-            <a:r>
-              <a:rPr lang="en-US" dirty="0"/>
-              <a:t>No longer part of the homework, here’s why. </a:t>
-            </a:r>
+            <a:endParaRPr lang="en-US"/>
           </a:p>
         </p:txBody>
       </p:sp>
     </p:spTree>
     <p:extLst>
       <p:ext uri="{BB962C8B-B14F-4D97-AF65-F5344CB8AC3E}">
-        <p14:creationId xmlns:p14="http://schemas.microsoft.com/office/powerpoint/2010/main" val="3456313373"/>
+        <p14:creationId xmlns:p14="http://schemas.microsoft.com/office/powerpoint/2010/main" val="796626276"/>
       </p:ext>
     </p:extLst>
   </p:cSld>
@@ -8554,7 +8651,7 @@
           <p:cNvPr id="2" name="Title 1">
             <a:extLst>
               <a:ext uri="{FF2B5EF4-FFF2-40B4-BE49-F238E27FC236}">
-                <a16:creationId xmlns:a16="http://schemas.microsoft.com/office/drawing/2014/main" id="{D4B5CB55-55A6-46CC-8F0B-F766D8136CDA}"/>
+                <a16:creationId xmlns:a16="http://schemas.microsoft.com/office/drawing/2014/main" id="{6F2795D9-CC6E-4634-9F7C-497FCE2C2853}"/>
               </a:ext>
             </a:extLst>
           </p:cNvPr>
@@ -8572,7 +8669,7 @@
           <a:p>
             <a:r>
               <a:rPr lang="en-US" dirty="0"/>
-              <a:t>Images</a:t>
+              <a:t>Flappy Bird Score</a:t>
             </a:r>
           </a:p>
         </p:txBody>
@@ -8582,7 +8679,7 @@
           <p:cNvPr id="3" name="Text Placeholder 2">
             <a:extLst>
               <a:ext uri="{FF2B5EF4-FFF2-40B4-BE49-F238E27FC236}">
-                <a16:creationId xmlns:a16="http://schemas.microsoft.com/office/drawing/2014/main" id="{B33ED613-E7E2-49A5-8C92-A73AADCE16A2}"/>
+                <a16:creationId xmlns:a16="http://schemas.microsoft.com/office/drawing/2014/main" id="{A8BC1F26-A260-485D-8747-13D51E760762}"/>
               </a:ext>
             </a:extLst>
           </p:cNvPr>
@@ -8598,14 +8695,29 @@
           <a:bodyPr/>
           <a:lstStyle/>
           <a:p>
-            <a:endParaRPr lang="en-US"/>
+            <a:r>
+              <a:rPr lang="en-US" dirty="0">
+                <a:hlinkClick r:id="rId2"/>
+              </a:rPr>
+              <a:t>https://cdpn.io/e/veNQJo</a:t>
+            </a:r>
+            <a:endParaRPr lang="en-US" dirty="0"/>
+          </a:p>
+          <a:p>
+            <a:endParaRPr lang="en-US" dirty="0"/>
+          </a:p>
+          <a:p>
+            <a:r>
+              <a:rPr lang="en-US" dirty="0"/>
+              <a:t>No longer part of the homework, here’s why. </a:t>
+            </a:r>
           </a:p>
         </p:txBody>
       </p:sp>
     </p:spTree>
     <p:extLst>
       <p:ext uri="{BB962C8B-B14F-4D97-AF65-F5344CB8AC3E}">
-        <p14:creationId xmlns:p14="http://schemas.microsoft.com/office/powerpoint/2010/main" val="2974473406"/>
+        <p14:creationId xmlns:p14="http://schemas.microsoft.com/office/powerpoint/2010/main" val="3456313373"/>
       </p:ext>
     </p:extLst>
   </p:cSld>
@@ -8637,6 +8749,156 @@
           <p:cNvPr id="2" name="Title 1">
             <a:extLst>
               <a:ext uri="{FF2B5EF4-FFF2-40B4-BE49-F238E27FC236}">
+                <a16:creationId xmlns:a16="http://schemas.microsoft.com/office/drawing/2014/main" id="{D4B5CB55-55A6-46CC-8F0B-F766D8136CDA}"/>
+              </a:ext>
+            </a:extLst>
+          </p:cNvPr>
+          <p:cNvSpPr>
+            <a:spLocks noGrp="1"/>
+          </p:cNvSpPr>
+          <p:nvPr>
+            <p:ph type="title"/>
+          </p:nvPr>
+        </p:nvSpPr>
+        <p:spPr/>
+        <p:txBody>
+          <a:bodyPr/>
+          <a:lstStyle/>
+          <a:p>
+            <a:r>
+              <a:rPr lang="en-US" dirty="0"/>
+              <a:t>Images</a:t>
+            </a:r>
+          </a:p>
+        </p:txBody>
+      </p:sp>
+    </p:spTree>
+    <p:extLst>
+      <p:ext uri="{BB962C8B-B14F-4D97-AF65-F5344CB8AC3E}">
+        <p14:creationId xmlns:p14="http://schemas.microsoft.com/office/powerpoint/2010/main" val="2974473406"/>
+      </p:ext>
+    </p:extLst>
+  </p:cSld>
+  <p:clrMapOvr>
+    <a:masterClrMapping/>
+  </p:clrMapOvr>
+</p:sld>
+</file>
+
+<file path=ppt/slides/slide45.xml><?xml version="1.0" encoding="utf-8"?>
+<p:sld xmlns:a="http://schemas.openxmlformats.org/drawingml/2006/main" xmlns:r="http://schemas.openxmlformats.org/officeDocument/2006/relationships" xmlns:p="http://schemas.openxmlformats.org/presentationml/2006/main">
+  <p:cSld>
+    <p:spTree>
+      <p:nvGrpSpPr>
+        <p:cNvPr id="1" name=""/>
+        <p:cNvGrpSpPr/>
+        <p:nvPr/>
+      </p:nvGrpSpPr>
+      <p:grpSpPr>
+        <a:xfrm>
+          <a:off x="0" y="0"/>
+          <a:ext cx="0" cy="0"/>
+          <a:chOff x="0" y="0"/>
+          <a:chExt cx="0" cy="0"/>
+        </a:xfrm>
+      </p:grpSpPr>
+      <p:sp>
+        <p:nvSpPr>
+          <p:cNvPr id="2" name="Title 1">
+            <a:extLst>
+              <a:ext uri="{FF2B5EF4-FFF2-40B4-BE49-F238E27FC236}">
+                <a16:creationId xmlns:a16="http://schemas.microsoft.com/office/drawing/2014/main" id="{B07F6296-3868-44FF-BAF7-2B3F0621F489}"/>
+              </a:ext>
+            </a:extLst>
+          </p:cNvPr>
+          <p:cNvSpPr>
+            <a:spLocks noGrp="1"/>
+          </p:cNvSpPr>
+          <p:nvPr>
+            <p:ph type="title"/>
+          </p:nvPr>
+        </p:nvSpPr>
+        <p:spPr/>
+        <p:txBody>
+          <a:bodyPr/>
+          <a:lstStyle/>
+          <a:p>
+            <a:r>
+              <a:rPr lang="en-US" dirty="0">
+                <a:hlinkClick r:id="rId2"/>
+              </a:rPr>
+              <a:t>https://imgur.com/mWtIlB1</a:t>
+            </a:r>
+            <a:r>
+              <a:rPr lang="en-US" dirty="0"/>
+              <a:t> </a:t>
+            </a:r>
+          </a:p>
+        </p:txBody>
+      </p:sp>
+      <p:sp>
+        <p:nvSpPr>
+          <p:cNvPr id="3" name="Text Placeholder 2">
+            <a:extLst>
+              <a:ext uri="{FF2B5EF4-FFF2-40B4-BE49-F238E27FC236}">
+                <a16:creationId xmlns:a16="http://schemas.microsoft.com/office/drawing/2014/main" id="{68CCF686-E298-4EA9-9A46-38A80AD40783}"/>
+              </a:ext>
+            </a:extLst>
+          </p:cNvPr>
+          <p:cNvSpPr>
+            <a:spLocks noGrp="1"/>
+          </p:cNvSpPr>
+          <p:nvPr>
+            <p:ph type="body" idx="1"/>
+          </p:nvPr>
+        </p:nvSpPr>
+        <p:spPr/>
+        <p:txBody>
+          <a:bodyPr/>
+          <a:lstStyle/>
+          <a:p>
+            <a:r>
+              <a:rPr lang="en-US" dirty="0"/>
+              <a:t>Flappy Bird image</a:t>
+            </a:r>
+          </a:p>
+        </p:txBody>
+      </p:sp>
+    </p:spTree>
+    <p:extLst>
+      <p:ext uri="{BB962C8B-B14F-4D97-AF65-F5344CB8AC3E}">
+        <p14:creationId xmlns:p14="http://schemas.microsoft.com/office/powerpoint/2010/main" val="2996516402"/>
+      </p:ext>
+    </p:extLst>
+  </p:cSld>
+  <p:clrMapOvr>
+    <a:masterClrMapping/>
+  </p:clrMapOvr>
+</p:sld>
+</file>
+
+<file path=ppt/slides/slide46.xml><?xml version="1.0" encoding="utf-8"?>
+<p:sld xmlns:a="http://schemas.openxmlformats.org/drawingml/2006/main" xmlns:r="http://schemas.openxmlformats.org/officeDocument/2006/relationships" xmlns:p="http://schemas.openxmlformats.org/presentationml/2006/main">
+  <p:cSld>
+    <p:spTree>
+      <p:nvGrpSpPr>
+        <p:cNvPr id="1" name=""/>
+        <p:cNvGrpSpPr/>
+        <p:nvPr/>
+      </p:nvGrpSpPr>
+      <p:grpSpPr>
+        <a:xfrm>
+          <a:off x="0" y="0"/>
+          <a:ext cx="0" cy="0"/>
+          <a:chOff x="0" y="0"/>
+          <a:chExt cx="0" cy="0"/>
+        </a:xfrm>
+      </p:grpSpPr>
+      <p:sp>
+        <p:nvSpPr>
+          <p:cNvPr id="2" name="Title 1">
+            <a:extLst>
+              <a:ext uri="{FF2B5EF4-FFF2-40B4-BE49-F238E27FC236}">
                 <a16:creationId xmlns:a16="http://schemas.microsoft.com/office/drawing/2014/main" id="{8947D8E0-551D-484B-A6DA-6E11EE0D720D}"/>
               </a:ext>
             </a:extLst>
@@ -8698,7 +8960,7 @@
 </p:sld>
 </file>
 
-<file path=ppt/slides/slide45.xml><?xml version="1.0" encoding="utf-8"?>
+<file path=ppt/slides/slide47.xml><?xml version="1.0" encoding="utf-8"?>
 <p:sld xmlns:a="http://schemas.openxmlformats.org/drawingml/2006/main" xmlns:r="http://schemas.openxmlformats.org/officeDocument/2006/relationships" xmlns:p="http://schemas.openxmlformats.org/presentationml/2006/main">
   <p:cSld>
     <p:spTree>
@@ -8907,254 +9169,6 @@
 </p:sld>
 </file>
 
-<file path=ppt/slides/slide46.xml><?xml version="1.0" encoding="utf-8"?>
-<p:sld xmlns:a="http://schemas.openxmlformats.org/drawingml/2006/main" xmlns:r="http://schemas.openxmlformats.org/officeDocument/2006/relationships" xmlns:p="http://schemas.openxmlformats.org/presentationml/2006/main">
-  <p:cSld>
-    <p:spTree>
-      <p:nvGrpSpPr>
-        <p:cNvPr id="1" name=""/>
-        <p:cNvGrpSpPr/>
-        <p:nvPr/>
-      </p:nvGrpSpPr>
-      <p:grpSpPr>
-        <a:xfrm>
-          <a:off x="0" y="0"/>
-          <a:ext cx="0" cy="0"/>
-          <a:chOff x="0" y="0"/>
-          <a:chExt cx="0" cy="0"/>
-        </a:xfrm>
-      </p:grpSpPr>
-      <p:sp>
-        <p:nvSpPr>
-          <p:cNvPr id="2" name="Title 1">
-            <a:extLst>
-              <a:ext uri="{FF2B5EF4-FFF2-40B4-BE49-F238E27FC236}">
-                <a16:creationId xmlns:a16="http://schemas.microsoft.com/office/drawing/2014/main" id="{5AEB6A52-CB9E-4255-BDFF-E60ED3A9C477}"/>
-              </a:ext>
-            </a:extLst>
-          </p:cNvPr>
-          <p:cNvSpPr>
-            <a:spLocks noGrp="1"/>
-          </p:cNvSpPr>
-          <p:nvPr>
-            <p:ph type="title"/>
-          </p:nvPr>
-        </p:nvSpPr>
-        <p:spPr/>
-        <p:txBody>
-          <a:bodyPr/>
-          <a:lstStyle/>
-          <a:p>
-            <a:r>
-              <a:rPr lang="en-US" dirty="0"/>
-              <a:t>Moving the Grid</a:t>
-            </a:r>
-          </a:p>
-        </p:txBody>
-      </p:sp>
-      <p:sp>
-        <p:nvSpPr>
-          <p:cNvPr id="3" name="Content Placeholder 2">
-            <a:extLst>
-              <a:ext uri="{FF2B5EF4-FFF2-40B4-BE49-F238E27FC236}">
-                <a16:creationId xmlns:a16="http://schemas.microsoft.com/office/drawing/2014/main" id="{AC269CDD-326A-4D72-ABE8-079015BB7CC8}"/>
-              </a:ext>
-            </a:extLst>
-          </p:cNvPr>
-          <p:cNvSpPr>
-            <a:spLocks noGrp="1"/>
-          </p:cNvSpPr>
-          <p:nvPr>
-            <p:ph idx="1"/>
-          </p:nvPr>
-        </p:nvSpPr>
-        <p:spPr/>
-        <p:txBody>
-          <a:bodyPr/>
-          <a:lstStyle/>
-          <a:p>
-            <a:r>
-              <a:rPr lang="en-US" b="1" dirty="0"/>
-              <a:t>push();</a:t>
-            </a:r>
-            <a:r>
-              <a:rPr lang="en-US" dirty="0"/>
-              <a:t> - Make a checkpoint</a:t>
-            </a:r>
-          </a:p>
-          <a:p>
-            <a:r>
-              <a:rPr lang="en-US" b="1" dirty="0"/>
-              <a:t>pop();</a:t>
-            </a:r>
-            <a:r>
-              <a:rPr lang="en-US" dirty="0"/>
-              <a:t> - Go back to the last checkpoint</a:t>
-            </a:r>
-          </a:p>
-          <a:p>
-            <a:endParaRPr lang="en-US" b="1" dirty="0"/>
-          </a:p>
-          <a:p>
-            <a:r>
-              <a:rPr lang="en-US" b="1" dirty="0"/>
-              <a:t>translate(dx, </a:t>
-            </a:r>
-            <a:r>
-              <a:rPr lang="en-US" b="1" dirty="0" err="1"/>
-              <a:t>dy</a:t>
-            </a:r>
-            <a:r>
-              <a:rPr lang="en-US" b="1" dirty="0"/>
-              <a:t>);</a:t>
-            </a:r>
-            <a:r>
-              <a:rPr lang="en-US" dirty="0"/>
-              <a:t> - Move the origin dx left and </a:t>
-            </a:r>
-            <a:r>
-              <a:rPr lang="en-US" dirty="0" err="1"/>
-              <a:t>dy</a:t>
-            </a:r>
-            <a:r>
-              <a:rPr lang="en-US" dirty="0"/>
-              <a:t> down</a:t>
-            </a:r>
-          </a:p>
-          <a:p>
-            <a:r>
-              <a:rPr lang="en-US" b="1" dirty="0"/>
-              <a:t>rotate(</a:t>
-            </a:r>
-            <a:r>
-              <a:rPr lang="en-US" b="1" dirty="0" err="1"/>
-              <a:t>rads</a:t>
-            </a:r>
-            <a:r>
-              <a:rPr lang="en-US" b="1" dirty="0"/>
-              <a:t>);</a:t>
-            </a:r>
-            <a:r>
-              <a:rPr lang="en-US" dirty="0"/>
-              <a:t> - Rotate the canvas around the origin</a:t>
-            </a:r>
-            <a:endParaRPr lang="en-US" b="1" dirty="0"/>
-          </a:p>
-        </p:txBody>
-      </p:sp>
-    </p:spTree>
-    <p:extLst>
-      <p:ext uri="{BB962C8B-B14F-4D97-AF65-F5344CB8AC3E}">
-        <p14:creationId xmlns:p14="http://schemas.microsoft.com/office/powerpoint/2010/main" val="1225180162"/>
-      </p:ext>
-    </p:extLst>
-  </p:cSld>
-  <p:clrMapOvr>
-    <a:masterClrMapping/>
-  </p:clrMapOvr>
-</p:sld>
-</file>
-
-<file path=ppt/slides/slide47.xml><?xml version="1.0" encoding="utf-8"?>
-<p:sld xmlns:a="http://schemas.openxmlformats.org/drawingml/2006/main" xmlns:r="http://schemas.openxmlformats.org/officeDocument/2006/relationships" xmlns:p="http://schemas.openxmlformats.org/presentationml/2006/main">
-  <p:cSld>
-    <p:spTree>
-      <p:nvGrpSpPr>
-        <p:cNvPr id="1" name=""/>
-        <p:cNvGrpSpPr/>
-        <p:nvPr/>
-      </p:nvGrpSpPr>
-      <p:grpSpPr>
-        <a:xfrm>
-          <a:off x="0" y="0"/>
-          <a:ext cx="0" cy="0"/>
-          <a:chOff x="0" y="0"/>
-          <a:chExt cx="0" cy="0"/>
-        </a:xfrm>
-      </p:grpSpPr>
-      <p:sp>
-        <p:nvSpPr>
-          <p:cNvPr id="2" name="Title 1">
-            <a:extLst>
-              <a:ext uri="{FF2B5EF4-FFF2-40B4-BE49-F238E27FC236}">
-                <a16:creationId xmlns:a16="http://schemas.microsoft.com/office/drawing/2014/main" id="{31FC31E6-F2C6-4820-9F8B-E46980180103}"/>
-              </a:ext>
-            </a:extLst>
-          </p:cNvPr>
-          <p:cNvSpPr>
-            <a:spLocks noGrp="1"/>
-          </p:cNvSpPr>
-          <p:nvPr>
-            <p:ph type="title"/>
-          </p:nvPr>
-        </p:nvSpPr>
-        <p:spPr/>
-        <p:txBody>
-          <a:bodyPr/>
-          <a:lstStyle/>
-          <a:p>
-            <a:r>
-              <a:rPr lang="en-US" dirty="0"/>
-              <a:t>Homework</a:t>
-            </a:r>
-          </a:p>
-        </p:txBody>
-      </p:sp>
-      <p:sp>
-        <p:nvSpPr>
-          <p:cNvPr id="3" name="Text Placeholder 2">
-            <a:extLst>
-              <a:ext uri="{FF2B5EF4-FFF2-40B4-BE49-F238E27FC236}">
-                <a16:creationId xmlns:a16="http://schemas.microsoft.com/office/drawing/2014/main" id="{6C32073C-09B5-4599-A0C3-7B36FD475B7D}"/>
-              </a:ext>
-            </a:extLst>
-          </p:cNvPr>
-          <p:cNvSpPr>
-            <a:spLocks noGrp="1"/>
-          </p:cNvSpPr>
-          <p:nvPr>
-            <p:ph type="body" idx="1"/>
-          </p:nvPr>
-        </p:nvSpPr>
-        <p:spPr/>
-        <p:txBody>
-          <a:bodyPr/>
-          <a:lstStyle/>
-          <a:p>
-            <a:r>
-              <a:rPr lang="en-US" dirty="0"/>
-              <a:t>There’s </a:t>
-            </a:r>
-            <a:r>
-              <a:rPr lang="en-US" b="1" i="1" dirty="0"/>
-              <a:t>no homework</a:t>
-            </a:r>
-            <a:r>
-              <a:rPr lang="en-US" dirty="0"/>
-              <a:t> so you can check out the tutorials I mentioned earlier</a:t>
-            </a:r>
-          </a:p>
-          <a:p>
-            <a:r>
-              <a:rPr lang="en-US" b="1" i="1" dirty="0"/>
-              <a:t>Flappy Bird is due on Wednesday</a:t>
-            </a:r>
-          </a:p>
-        </p:txBody>
-      </p:sp>
-    </p:spTree>
-    <p:extLst>
-      <p:ext uri="{BB962C8B-B14F-4D97-AF65-F5344CB8AC3E}">
-        <p14:creationId xmlns:p14="http://schemas.microsoft.com/office/powerpoint/2010/main" val="509158"/>
-      </p:ext>
-    </p:extLst>
-  </p:cSld>
-  <p:clrMapOvr>
-    <a:masterClrMapping/>
-  </p:clrMapOvr>
-</p:sld>
-</file>
-
 <file path=ppt/slides/slide48.xml><?xml version="1.0" encoding="utf-8"?>
 <p:sld xmlns:a="http://schemas.openxmlformats.org/drawingml/2006/main" xmlns:r="http://schemas.openxmlformats.org/officeDocument/2006/relationships" xmlns:p="http://schemas.openxmlformats.org/presentationml/2006/main">
   <p:cSld>
@@ -9177,7 +9191,7 @@
           <p:cNvPr id="2" name="Title 1">
             <a:extLst>
               <a:ext uri="{FF2B5EF4-FFF2-40B4-BE49-F238E27FC236}">
-                <a16:creationId xmlns:a16="http://schemas.microsoft.com/office/drawing/2014/main" id="{43ECA902-DF3A-43B3-8248-CA28ADD9A6F7}"/>
+                <a16:creationId xmlns:a16="http://schemas.microsoft.com/office/drawing/2014/main" id="{5AEB6A52-CB9E-4255-BDFF-E60ED3A9C477}"/>
               </a:ext>
             </a:extLst>
           </p:cNvPr>
@@ -9194,187 +9208,106 @@
           <a:lstStyle/>
           <a:p>
             <a:r>
+              <a:rPr lang="en-US" dirty="0"/>
+              <a:t>Moving the Grid</a:t>
+            </a:r>
+          </a:p>
+        </p:txBody>
+      </p:sp>
+      <p:sp>
+        <p:nvSpPr>
+          <p:cNvPr id="3" name="Content Placeholder 2">
+            <a:extLst>
+              <a:ext uri="{FF2B5EF4-FFF2-40B4-BE49-F238E27FC236}">
+                <a16:creationId xmlns:a16="http://schemas.microsoft.com/office/drawing/2014/main" id="{AC269CDD-326A-4D72-ABE8-079015BB7CC8}"/>
+              </a:ext>
+            </a:extLst>
+          </p:cNvPr>
+          <p:cNvSpPr>
+            <a:spLocks noGrp="1"/>
+          </p:cNvSpPr>
+          <p:nvPr>
+            <p:ph idx="1"/>
+          </p:nvPr>
+        </p:nvSpPr>
+        <p:spPr/>
+        <p:txBody>
+          <a:bodyPr/>
+          <a:lstStyle/>
+          <a:p>
+            <a:r>
               <a:rPr lang="en-US" b="1" dirty="0"/>
-              <a:t>More Practice</a:t>
-            </a:r>
-          </a:p>
-        </p:txBody>
-      </p:sp>
-      <p:sp>
-        <p:nvSpPr>
-          <p:cNvPr id="3" name="Content Placeholder 2">
-            <a:extLst>
-              <a:ext uri="{FF2B5EF4-FFF2-40B4-BE49-F238E27FC236}">
-                <a16:creationId xmlns:a16="http://schemas.microsoft.com/office/drawing/2014/main" id="{030690F5-F4BC-46D7-88A0-D9DD6AA4F52F}"/>
-              </a:ext>
-            </a:extLst>
-          </p:cNvPr>
-          <p:cNvSpPr>
-            <a:spLocks noGrp="1"/>
-          </p:cNvSpPr>
-          <p:nvPr>
-            <p:ph sz="half" idx="1"/>
-          </p:nvPr>
-        </p:nvSpPr>
-        <p:spPr>
-          <a:xfrm>
-            <a:off x="838200" y="1825625"/>
-            <a:ext cx="5181600" cy="4351338"/>
-          </a:xfrm>
-        </p:spPr>
-        <p:txBody>
-          <a:bodyPr>
-            <a:normAutofit/>
-          </a:bodyPr>
-          <a:lstStyle/>
-          <a:p>
-            <a:pPr marL="0" indent="0">
-              <a:buNone/>
-            </a:pPr>
-            <a:r>
-              <a:rPr lang="en-US" i="1" dirty="0"/>
-              <a:t>Tutorials</a:t>
-            </a:r>
-          </a:p>
-          <a:p>
-            <a:pPr marL="0" indent="0">
-              <a:buNone/>
-            </a:pPr>
+              <a:t>push();</a:t>
+            </a:r>
+            <a:r>
+              <a:rPr lang="en-US" dirty="0"/>
+              <a:t> - Make a checkpoint</a:t>
+            </a:r>
+          </a:p>
+          <a:p>
             <a:r>
               <a:rPr lang="en-US" b="1" dirty="0"/>
-              <a:t>YouTube: Daniel </a:t>
+              <a:t>pop();</a:t>
+            </a:r>
+            <a:r>
+              <a:rPr lang="en-US" dirty="0"/>
+              <a:t> - Go back to the last checkpoint</a:t>
+            </a:r>
+          </a:p>
+          <a:p>
+            <a:endParaRPr lang="en-US" b="1" dirty="0"/>
+          </a:p>
+          <a:p>
+            <a:r>
+              <a:rPr lang="en-US" b="1" dirty="0"/>
+              <a:t>translate(dx, </a:t>
             </a:r>
             <a:r>
               <a:rPr lang="en-US" b="1" dirty="0" err="1"/>
-              <a:t>Shiffman</a:t>
+              <a:t>dy</a:t>
+            </a:r>
+            <a:r>
+              <a:rPr lang="en-US" b="1" dirty="0"/>
+              <a:t>);</a:t>
+            </a:r>
+            <a:r>
+              <a:rPr lang="en-US" dirty="0"/>
+              <a:t> - Move the origin dx left and </a:t>
+            </a:r>
+            <a:r>
+              <a:rPr lang="en-US" dirty="0" err="1"/>
+              <a:t>dy</a:t>
+            </a:r>
+            <a:r>
+              <a:rPr lang="en-US" dirty="0"/>
+              <a:t> down</a:t>
+            </a:r>
+          </a:p>
+          <a:p>
+            <a:r>
+              <a:rPr lang="en-US" b="1" dirty="0"/>
+              <a:t>rotate(</a:t>
+            </a:r>
+            <a:r>
+              <a:rPr lang="en-US" b="1" dirty="0" err="1"/>
+              <a:t>rads</a:t>
+            </a:r>
+            <a:r>
+              <a:rPr lang="en-US" b="1" dirty="0"/>
+              <a:t>);</a:t>
+            </a:r>
+            <a:r>
+              <a:rPr lang="en-US" dirty="0"/>
+              <a:t> - Rotate the canvas around the origin</a:t>
             </a:r>
             <a:endParaRPr lang="en-US" b="1" dirty="0"/>
-          </a:p>
-          <a:p>
-            <a:pPr marL="0" indent="0">
-              <a:buNone/>
-            </a:pPr>
-            <a:r>
-              <a:rPr lang="en-US" b="1" dirty="0"/>
-              <a:t>https://p5js.org/learn/</a:t>
-            </a:r>
-            <a:endParaRPr lang="en-US" dirty="0"/>
-          </a:p>
-          <a:p>
-            <a:pPr marL="0" indent="0">
-              <a:buNone/>
-            </a:pPr>
-            <a:endParaRPr lang="en-US" b="1" dirty="0"/>
-          </a:p>
-          <a:p>
-            <a:pPr marL="0" indent="0">
-              <a:buNone/>
-            </a:pPr>
-            <a:r>
-              <a:rPr lang="en-US" i="1" dirty="0"/>
-              <a:t>Coding Mindset Practice</a:t>
-            </a:r>
-          </a:p>
-          <a:p>
-            <a:r>
-              <a:rPr lang="en-US" b="1" dirty="0"/>
-              <a:t>Scratch</a:t>
-            </a:r>
-            <a:r>
-              <a:rPr lang="en-US" dirty="0"/>
-              <a:t> – scratch.mit.edu</a:t>
-            </a:r>
-            <a:endParaRPr lang="en-US" b="1" dirty="0"/>
-          </a:p>
-        </p:txBody>
-      </p:sp>
-      <p:sp>
-        <p:nvSpPr>
-          <p:cNvPr id="4" name="Content Placeholder 3">
-            <a:extLst>
-              <a:ext uri="{FF2B5EF4-FFF2-40B4-BE49-F238E27FC236}">
-                <a16:creationId xmlns:a16="http://schemas.microsoft.com/office/drawing/2014/main" id="{24EB37D5-187B-4E08-A853-F4961CC80180}"/>
-              </a:ext>
-            </a:extLst>
-          </p:cNvPr>
-          <p:cNvSpPr>
-            <a:spLocks noGrp="1"/>
-          </p:cNvSpPr>
-          <p:nvPr>
-            <p:ph sz="half" idx="2"/>
-          </p:nvPr>
-        </p:nvSpPr>
-        <p:spPr/>
-        <p:txBody>
-          <a:bodyPr/>
-          <a:lstStyle/>
-          <a:p>
-            <a:pPr marL="0" indent="0">
-              <a:buNone/>
-            </a:pPr>
-            <a:r>
-              <a:rPr lang="en-US" i="1" dirty="0"/>
-              <a:t>Games</a:t>
-            </a:r>
-            <a:endParaRPr lang="en-US" dirty="0"/>
-          </a:p>
-          <a:p>
-            <a:r>
-              <a:rPr lang="en-US" b="1" dirty="0"/>
-              <a:t>Human Resource Machine</a:t>
-            </a:r>
-          </a:p>
-          <a:p>
-            <a:pPr lvl="1"/>
-            <a:r>
-              <a:rPr lang="en-US" dirty="0"/>
-              <a:t> Files on Canvas</a:t>
-            </a:r>
-            <a:endParaRPr lang="en-US" b="1" dirty="0"/>
-          </a:p>
-          <a:p>
-            <a:r>
-              <a:rPr lang="en-US" b="1" dirty="0"/>
-              <a:t>Lightbot</a:t>
-            </a:r>
-            <a:r>
-              <a:rPr lang="en-US" dirty="0"/>
-              <a:t> – lightbot.com</a:t>
-            </a:r>
-            <a:endParaRPr lang="en-US" b="1" dirty="0"/>
-          </a:p>
-          <a:p>
-            <a:endParaRPr lang="en-US" dirty="0"/>
-          </a:p>
-          <a:p>
-            <a:pPr marL="0" indent="0">
-              <a:buNone/>
-            </a:pPr>
-            <a:r>
-              <a:rPr lang="en-US" i="1" dirty="0"/>
-              <a:t>Challenges</a:t>
-            </a:r>
-          </a:p>
-          <a:p>
-            <a:r>
-              <a:rPr lang="en-US" b="1" dirty="0"/>
-              <a:t>/r/</a:t>
-            </a:r>
-            <a:r>
-              <a:rPr lang="en-US" b="1" dirty="0" err="1"/>
-              <a:t>dailyprogrammer</a:t>
-            </a:r>
-            <a:r>
-              <a:rPr lang="en-US" b="1" dirty="0"/>
-              <a:t>/</a:t>
-            </a:r>
           </a:p>
         </p:txBody>
       </p:sp>
     </p:spTree>
     <p:extLst>
       <p:ext uri="{BB962C8B-B14F-4D97-AF65-F5344CB8AC3E}">
-        <p14:creationId xmlns:p14="http://schemas.microsoft.com/office/powerpoint/2010/main" val="2493183476"/>
+        <p14:creationId xmlns:p14="http://schemas.microsoft.com/office/powerpoint/2010/main" val="1225180162"/>
       </p:ext>
     </p:extLst>
   </p:cSld>
@@ -9403,10 +9336,10 @@
       </p:grpSpPr>
       <p:sp>
         <p:nvSpPr>
-          <p:cNvPr id="7" name="Title 6">
-            <a:extLst>
-              <a:ext uri="{FF2B5EF4-FFF2-40B4-BE49-F238E27FC236}">
-                <a16:creationId xmlns:a16="http://schemas.microsoft.com/office/drawing/2014/main" id="{CE741E18-51F3-4734-B942-7224C7A3815B}"/>
+          <p:cNvPr id="2" name="Title 1">
+            <a:extLst>
+              <a:ext uri="{FF2B5EF4-FFF2-40B4-BE49-F238E27FC236}">
+                <a16:creationId xmlns:a16="http://schemas.microsoft.com/office/drawing/2014/main" id="{31FC31E6-F2C6-4820-9F8B-E46980180103}"/>
               </a:ext>
             </a:extLst>
           </p:cNvPr>
@@ -9424,17 +9357,17 @@
           <a:p>
             <a:r>
               <a:rPr lang="en-US" dirty="0"/>
-              <a:t>Minute Surveys</a:t>
-            </a:r>
-          </a:p>
-        </p:txBody>
-      </p:sp>
-      <p:sp>
-        <p:nvSpPr>
-          <p:cNvPr id="8" name="Text Placeholder 7">
-            <a:extLst>
-              <a:ext uri="{FF2B5EF4-FFF2-40B4-BE49-F238E27FC236}">
-                <a16:creationId xmlns:a16="http://schemas.microsoft.com/office/drawing/2014/main" id="{D50B0A8A-B494-45BF-AA59-109DEA4CA158}"/>
+              <a:t>Homework</a:t>
+            </a:r>
+          </a:p>
+        </p:txBody>
+      </p:sp>
+      <p:sp>
+        <p:nvSpPr>
+          <p:cNvPr id="3" name="Text Placeholder 2">
+            <a:extLst>
+              <a:ext uri="{FF2B5EF4-FFF2-40B4-BE49-F238E27FC236}">
+                <a16:creationId xmlns:a16="http://schemas.microsoft.com/office/drawing/2014/main" id="{6C32073C-09B5-4599-A0C3-7B36FD475B7D}"/>
               </a:ext>
             </a:extLst>
           </p:cNvPr>
@@ -9451,27 +9384,30 @@
           <a:lstStyle/>
           <a:p>
             <a:r>
+              <a:rPr lang="en-US" dirty="0"/>
+              <a:t>There’s </a:t>
+            </a:r>
+            <a:r>
               <a:rPr lang="en-US" b="1" i="1" dirty="0"/>
-              <a:t>ON THE BACK</a:t>
-            </a:r>
-          </a:p>
-          <a:p>
-            <a:r>
-              <a:rPr lang="en-US" dirty="0"/>
-              <a:t>Draw a circle and mark:</a:t>
-            </a:r>
+              <a:t>no homework</a:t>
+            </a:r>
+            <a:r>
+              <a:rPr lang="en-US" dirty="0"/>
+              <a:t> so you can check out the tutorials I mentioned earlier</a:t>
+            </a:r>
+          </a:p>
+          <a:p>
             <a:r>
               <a:rPr lang="en-US" b="1" i="1" dirty="0"/>
-              <a:t> 0 radians, 45 degrees, PI radians, -PI / 3 radians</a:t>
-            </a:r>
-            <a:endParaRPr lang="en-US" dirty="0"/>
+              <a:t>Flappy Bird is due on Wednesday</a:t>
+            </a:r>
           </a:p>
         </p:txBody>
       </p:sp>
     </p:spTree>
     <p:extLst>
       <p:ext uri="{BB962C8B-B14F-4D97-AF65-F5344CB8AC3E}">
-        <p14:creationId xmlns:p14="http://schemas.microsoft.com/office/powerpoint/2010/main" val="1034348312"/>
+        <p14:creationId xmlns:p14="http://schemas.microsoft.com/office/powerpoint/2010/main" val="509158"/>
       </p:ext>
     </p:extLst>
   </p:cSld>
@@ -9783,6 +9719,332 @@
 </file>
 
 <file path=ppt/slides/slide50.xml><?xml version="1.0" encoding="utf-8"?>
+<p:sld xmlns:a="http://schemas.openxmlformats.org/drawingml/2006/main" xmlns:r="http://schemas.openxmlformats.org/officeDocument/2006/relationships" xmlns:p="http://schemas.openxmlformats.org/presentationml/2006/main">
+  <p:cSld>
+    <p:spTree>
+      <p:nvGrpSpPr>
+        <p:cNvPr id="1" name=""/>
+        <p:cNvGrpSpPr/>
+        <p:nvPr/>
+      </p:nvGrpSpPr>
+      <p:grpSpPr>
+        <a:xfrm>
+          <a:off x="0" y="0"/>
+          <a:ext cx="0" cy="0"/>
+          <a:chOff x="0" y="0"/>
+          <a:chExt cx="0" cy="0"/>
+        </a:xfrm>
+      </p:grpSpPr>
+      <p:sp>
+        <p:nvSpPr>
+          <p:cNvPr id="2" name="Title 1">
+            <a:extLst>
+              <a:ext uri="{FF2B5EF4-FFF2-40B4-BE49-F238E27FC236}">
+                <a16:creationId xmlns:a16="http://schemas.microsoft.com/office/drawing/2014/main" id="{43ECA902-DF3A-43B3-8248-CA28ADD9A6F7}"/>
+              </a:ext>
+            </a:extLst>
+          </p:cNvPr>
+          <p:cNvSpPr>
+            <a:spLocks noGrp="1"/>
+          </p:cNvSpPr>
+          <p:nvPr>
+            <p:ph type="title"/>
+          </p:nvPr>
+        </p:nvSpPr>
+        <p:spPr/>
+        <p:txBody>
+          <a:bodyPr/>
+          <a:lstStyle/>
+          <a:p>
+            <a:r>
+              <a:rPr lang="en-US" b="1" dirty="0"/>
+              <a:t>More Practice</a:t>
+            </a:r>
+          </a:p>
+        </p:txBody>
+      </p:sp>
+      <p:sp>
+        <p:nvSpPr>
+          <p:cNvPr id="3" name="Content Placeholder 2">
+            <a:extLst>
+              <a:ext uri="{FF2B5EF4-FFF2-40B4-BE49-F238E27FC236}">
+                <a16:creationId xmlns:a16="http://schemas.microsoft.com/office/drawing/2014/main" id="{030690F5-F4BC-46D7-88A0-D9DD6AA4F52F}"/>
+              </a:ext>
+            </a:extLst>
+          </p:cNvPr>
+          <p:cNvSpPr>
+            <a:spLocks noGrp="1"/>
+          </p:cNvSpPr>
+          <p:nvPr>
+            <p:ph sz="half" idx="1"/>
+          </p:nvPr>
+        </p:nvSpPr>
+        <p:spPr>
+          <a:xfrm>
+            <a:off x="838200" y="1825625"/>
+            <a:ext cx="5181600" cy="4351338"/>
+          </a:xfrm>
+        </p:spPr>
+        <p:txBody>
+          <a:bodyPr>
+            <a:normAutofit/>
+          </a:bodyPr>
+          <a:lstStyle/>
+          <a:p>
+            <a:pPr marL="0" indent="0">
+              <a:buNone/>
+            </a:pPr>
+            <a:r>
+              <a:rPr lang="en-US" i="1" dirty="0"/>
+              <a:t>Tutorials</a:t>
+            </a:r>
+          </a:p>
+          <a:p>
+            <a:pPr marL="0" indent="0">
+              <a:buNone/>
+            </a:pPr>
+            <a:r>
+              <a:rPr lang="en-US" b="1" dirty="0"/>
+              <a:t>YouTube: Daniel </a:t>
+            </a:r>
+            <a:r>
+              <a:rPr lang="en-US" b="1" dirty="0" err="1"/>
+              <a:t>Shiffman</a:t>
+            </a:r>
+            <a:endParaRPr lang="en-US" b="1" dirty="0"/>
+          </a:p>
+          <a:p>
+            <a:pPr marL="0" indent="0">
+              <a:buNone/>
+            </a:pPr>
+            <a:r>
+              <a:rPr lang="en-US" b="1" dirty="0"/>
+              <a:t>https://p5js.org/learn/</a:t>
+            </a:r>
+            <a:endParaRPr lang="en-US" dirty="0"/>
+          </a:p>
+          <a:p>
+            <a:pPr marL="0" indent="0">
+              <a:buNone/>
+            </a:pPr>
+            <a:endParaRPr lang="en-US" b="1" dirty="0"/>
+          </a:p>
+          <a:p>
+            <a:pPr marL="0" indent="0">
+              <a:buNone/>
+            </a:pPr>
+            <a:r>
+              <a:rPr lang="en-US" i="1" dirty="0"/>
+              <a:t>Coding Mindset Practice</a:t>
+            </a:r>
+          </a:p>
+          <a:p>
+            <a:r>
+              <a:rPr lang="en-US" b="1" dirty="0"/>
+              <a:t>Scratch</a:t>
+            </a:r>
+            <a:r>
+              <a:rPr lang="en-US" dirty="0"/>
+              <a:t> – scratch.mit.edu</a:t>
+            </a:r>
+            <a:endParaRPr lang="en-US" b="1" dirty="0"/>
+          </a:p>
+        </p:txBody>
+      </p:sp>
+      <p:sp>
+        <p:nvSpPr>
+          <p:cNvPr id="4" name="Content Placeholder 3">
+            <a:extLst>
+              <a:ext uri="{FF2B5EF4-FFF2-40B4-BE49-F238E27FC236}">
+                <a16:creationId xmlns:a16="http://schemas.microsoft.com/office/drawing/2014/main" id="{24EB37D5-187B-4E08-A853-F4961CC80180}"/>
+              </a:ext>
+            </a:extLst>
+          </p:cNvPr>
+          <p:cNvSpPr>
+            <a:spLocks noGrp="1"/>
+          </p:cNvSpPr>
+          <p:nvPr>
+            <p:ph sz="half" idx="2"/>
+          </p:nvPr>
+        </p:nvSpPr>
+        <p:spPr/>
+        <p:txBody>
+          <a:bodyPr/>
+          <a:lstStyle/>
+          <a:p>
+            <a:pPr marL="0" indent="0">
+              <a:buNone/>
+            </a:pPr>
+            <a:r>
+              <a:rPr lang="en-US" i="1" dirty="0"/>
+              <a:t>Games</a:t>
+            </a:r>
+            <a:endParaRPr lang="en-US" dirty="0"/>
+          </a:p>
+          <a:p>
+            <a:r>
+              <a:rPr lang="en-US" b="1" dirty="0"/>
+              <a:t>Human Resource Machine</a:t>
+            </a:r>
+          </a:p>
+          <a:p>
+            <a:pPr lvl="1"/>
+            <a:r>
+              <a:rPr lang="en-US" dirty="0"/>
+              <a:t> Files on Canvas</a:t>
+            </a:r>
+            <a:endParaRPr lang="en-US" b="1" dirty="0"/>
+          </a:p>
+          <a:p>
+            <a:r>
+              <a:rPr lang="en-US" b="1" dirty="0"/>
+              <a:t>Lightbot</a:t>
+            </a:r>
+            <a:r>
+              <a:rPr lang="en-US" dirty="0"/>
+              <a:t> – lightbot.com</a:t>
+            </a:r>
+            <a:endParaRPr lang="en-US" b="1" dirty="0"/>
+          </a:p>
+          <a:p>
+            <a:endParaRPr lang="en-US" dirty="0"/>
+          </a:p>
+          <a:p>
+            <a:pPr marL="0" indent="0">
+              <a:buNone/>
+            </a:pPr>
+            <a:r>
+              <a:rPr lang="en-US" i="1" dirty="0"/>
+              <a:t>Challenges</a:t>
+            </a:r>
+          </a:p>
+          <a:p>
+            <a:r>
+              <a:rPr lang="en-US" b="1" dirty="0"/>
+              <a:t>/r/</a:t>
+            </a:r>
+            <a:r>
+              <a:rPr lang="en-US" b="1" dirty="0" err="1"/>
+              <a:t>dailyprogrammer</a:t>
+            </a:r>
+            <a:r>
+              <a:rPr lang="en-US" b="1" dirty="0"/>
+              <a:t>/</a:t>
+            </a:r>
+          </a:p>
+        </p:txBody>
+      </p:sp>
+    </p:spTree>
+    <p:extLst>
+      <p:ext uri="{BB962C8B-B14F-4D97-AF65-F5344CB8AC3E}">
+        <p14:creationId xmlns:p14="http://schemas.microsoft.com/office/powerpoint/2010/main" val="2493183476"/>
+      </p:ext>
+    </p:extLst>
+  </p:cSld>
+  <p:clrMapOvr>
+    <a:masterClrMapping/>
+  </p:clrMapOvr>
+</p:sld>
+</file>
+
+<file path=ppt/slides/slide51.xml><?xml version="1.0" encoding="utf-8"?>
+<p:sld xmlns:a="http://schemas.openxmlformats.org/drawingml/2006/main" xmlns:r="http://schemas.openxmlformats.org/officeDocument/2006/relationships" xmlns:p="http://schemas.openxmlformats.org/presentationml/2006/main">
+  <p:cSld>
+    <p:spTree>
+      <p:nvGrpSpPr>
+        <p:cNvPr id="1" name=""/>
+        <p:cNvGrpSpPr/>
+        <p:nvPr/>
+      </p:nvGrpSpPr>
+      <p:grpSpPr>
+        <a:xfrm>
+          <a:off x="0" y="0"/>
+          <a:ext cx="0" cy="0"/>
+          <a:chOff x="0" y="0"/>
+          <a:chExt cx="0" cy="0"/>
+        </a:xfrm>
+      </p:grpSpPr>
+      <p:sp>
+        <p:nvSpPr>
+          <p:cNvPr id="7" name="Title 6">
+            <a:extLst>
+              <a:ext uri="{FF2B5EF4-FFF2-40B4-BE49-F238E27FC236}">
+                <a16:creationId xmlns:a16="http://schemas.microsoft.com/office/drawing/2014/main" id="{CE741E18-51F3-4734-B942-7224C7A3815B}"/>
+              </a:ext>
+            </a:extLst>
+          </p:cNvPr>
+          <p:cNvSpPr>
+            <a:spLocks noGrp="1"/>
+          </p:cNvSpPr>
+          <p:nvPr>
+            <p:ph type="title"/>
+          </p:nvPr>
+        </p:nvSpPr>
+        <p:spPr/>
+        <p:txBody>
+          <a:bodyPr/>
+          <a:lstStyle/>
+          <a:p>
+            <a:r>
+              <a:rPr lang="en-US" dirty="0"/>
+              <a:t>Minute Surveys</a:t>
+            </a:r>
+          </a:p>
+        </p:txBody>
+      </p:sp>
+      <p:sp>
+        <p:nvSpPr>
+          <p:cNvPr id="8" name="Text Placeholder 7">
+            <a:extLst>
+              <a:ext uri="{FF2B5EF4-FFF2-40B4-BE49-F238E27FC236}">
+                <a16:creationId xmlns:a16="http://schemas.microsoft.com/office/drawing/2014/main" id="{D50B0A8A-B494-45BF-AA59-109DEA4CA158}"/>
+              </a:ext>
+            </a:extLst>
+          </p:cNvPr>
+          <p:cNvSpPr>
+            <a:spLocks noGrp="1"/>
+          </p:cNvSpPr>
+          <p:nvPr>
+            <p:ph type="body" idx="1"/>
+          </p:nvPr>
+        </p:nvSpPr>
+        <p:spPr/>
+        <p:txBody>
+          <a:bodyPr/>
+          <a:lstStyle/>
+          <a:p>
+            <a:r>
+              <a:rPr lang="en-US" b="1" i="1" dirty="0"/>
+              <a:t>ON THE BACK</a:t>
+            </a:r>
+          </a:p>
+          <a:p>
+            <a:r>
+              <a:rPr lang="en-US" dirty="0"/>
+              <a:t>Draw a circle and mark:</a:t>
+            </a:r>
+            <a:r>
+              <a:rPr lang="en-US" b="1" i="1" dirty="0"/>
+              <a:t> 0 radians, 45 degrees, PI radians, -PI / 3 radians</a:t>
+            </a:r>
+            <a:endParaRPr lang="en-US" dirty="0"/>
+          </a:p>
+        </p:txBody>
+      </p:sp>
+    </p:spTree>
+    <p:extLst>
+      <p:ext uri="{BB962C8B-B14F-4D97-AF65-F5344CB8AC3E}">
+        <p14:creationId xmlns:p14="http://schemas.microsoft.com/office/powerpoint/2010/main" val="1034348312"/>
+      </p:ext>
+    </p:extLst>
+  </p:cSld>
+  <p:clrMapOvr>
+    <a:masterClrMapping/>
+  </p:clrMapOvr>
+</p:sld>
+</file>
+
+<file path=ppt/slides/slide52.xml><?xml version="1.0" encoding="utf-8"?>
 <p:sld xmlns:a="http://schemas.openxmlformats.org/drawingml/2006/main" xmlns:r="http://schemas.openxmlformats.org/officeDocument/2006/relationships" xmlns:p="http://schemas.openxmlformats.org/presentationml/2006/main">
   <p:cSld>
     <p:spTree>

</xml_diff>